<commit_message>
add test result for each workers
</commit_message>
<xml_diff>
--- a/docs/Final Presentation.pptx
+++ b/docs/Final Presentation.pptx
@@ -8,10 +8,11 @@
     <p:sldId id="256" r:id="rId2"/>
     <p:sldId id="257" r:id="rId3"/>
     <p:sldId id="258" r:id="rId4"/>
-    <p:sldId id="259" r:id="rId5"/>
-    <p:sldId id="260" r:id="rId6"/>
-    <p:sldId id="262" r:id="rId7"/>
-    <p:sldId id="261" r:id="rId8"/>
+    <p:sldId id="263" r:id="rId5"/>
+    <p:sldId id="259" r:id="rId6"/>
+    <p:sldId id="260" r:id="rId7"/>
+    <p:sldId id="262" r:id="rId8"/>
+    <p:sldId id="261" r:id="rId9"/>
   </p:sldIdLst>
   <p:sldSz cx="12192000" cy="6858000"/>
   <p:notesSz cx="6858000" cy="9144000"/>
@@ -110,6 +111,11 @@
       </a:defRPr>
     </a:lvl9pPr>
   </p:defaultTextStyle>
+  <p:extLst>
+    <p:ext uri="{EFAFB233-063F-42B5-8137-9DF3F51BA10A}">
+      <p15:sldGuideLst xmlns:p15="http://schemas.microsoft.com/office/powerpoint/2012/main"/>
+    </p:ext>
+  </p:extLst>
 </p:presentation>
 </file>
 
@@ -262,7 +268,7 @@
           <a:p>
             <a:fld id="{B6CC3BC1-992D-1F43-98B1-8B8E610D7F7F}" type="datetimeFigureOut">
               <a:rPr kumimoji="1" lang="ko-Kore-DK" altLang="en-US" smtClean="0"/>
-              <a:t>12.12.2023</a:t>
+              <a:t>13.12.2023</a:t>
             </a:fld>
             <a:endParaRPr kumimoji="1" lang="ko-Kore-DK" altLang="en-US"/>
           </a:p>
@@ -462,7 +468,7 @@
           <a:p>
             <a:fld id="{B6CC3BC1-992D-1F43-98B1-8B8E610D7F7F}" type="datetimeFigureOut">
               <a:rPr kumimoji="1" lang="ko-Kore-DK" altLang="en-US" smtClean="0"/>
-              <a:t>12.12.2023</a:t>
+              <a:t>13.12.2023</a:t>
             </a:fld>
             <a:endParaRPr kumimoji="1" lang="ko-Kore-DK" altLang="en-US"/>
           </a:p>
@@ -672,7 +678,7 @@
           <a:p>
             <a:fld id="{B6CC3BC1-992D-1F43-98B1-8B8E610D7F7F}" type="datetimeFigureOut">
               <a:rPr kumimoji="1" lang="ko-Kore-DK" altLang="en-US" smtClean="0"/>
-              <a:t>12.12.2023</a:t>
+              <a:t>13.12.2023</a:t>
             </a:fld>
             <a:endParaRPr kumimoji="1" lang="ko-Kore-DK" altLang="en-US"/>
           </a:p>
@@ -872,7 +878,7 @@
           <a:p>
             <a:fld id="{B6CC3BC1-992D-1F43-98B1-8B8E610D7F7F}" type="datetimeFigureOut">
               <a:rPr kumimoji="1" lang="ko-Kore-DK" altLang="en-US" smtClean="0"/>
-              <a:t>12.12.2023</a:t>
+              <a:t>13.12.2023</a:t>
             </a:fld>
             <a:endParaRPr kumimoji="1" lang="ko-Kore-DK" altLang="en-US"/>
           </a:p>
@@ -1148,7 +1154,7 @@
           <a:p>
             <a:fld id="{B6CC3BC1-992D-1F43-98B1-8B8E610D7F7F}" type="datetimeFigureOut">
               <a:rPr kumimoji="1" lang="ko-Kore-DK" altLang="en-US" smtClean="0"/>
-              <a:t>12.12.2023</a:t>
+              <a:t>13.12.2023</a:t>
             </a:fld>
             <a:endParaRPr kumimoji="1" lang="ko-Kore-DK" altLang="en-US"/>
           </a:p>
@@ -1416,7 +1422,7 @@
           <a:p>
             <a:fld id="{B6CC3BC1-992D-1F43-98B1-8B8E610D7F7F}" type="datetimeFigureOut">
               <a:rPr kumimoji="1" lang="ko-Kore-DK" altLang="en-US" smtClean="0"/>
-              <a:t>12.12.2023</a:t>
+              <a:t>13.12.2023</a:t>
             </a:fld>
             <a:endParaRPr kumimoji="1" lang="ko-Kore-DK" altLang="en-US"/>
           </a:p>
@@ -1831,7 +1837,7 @@
           <a:p>
             <a:fld id="{B6CC3BC1-992D-1F43-98B1-8B8E610D7F7F}" type="datetimeFigureOut">
               <a:rPr kumimoji="1" lang="ko-Kore-DK" altLang="en-US" smtClean="0"/>
-              <a:t>12.12.2023</a:t>
+              <a:t>13.12.2023</a:t>
             </a:fld>
             <a:endParaRPr kumimoji="1" lang="ko-Kore-DK" altLang="en-US"/>
           </a:p>
@@ -1973,7 +1979,7 @@
           <a:p>
             <a:fld id="{B6CC3BC1-992D-1F43-98B1-8B8E610D7F7F}" type="datetimeFigureOut">
               <a:rPr kumimoji="1" lang="ko-Kore-DK" altLang="en-US" smtClean="0"/>
-              <a:t>12.12.2023</a:t>
+              <a:t>13.12.2023</a:t>
             </a:fld>
             <a:endParaRPr kumimoji="1" lang="ko-Kore-DK" altLang="en-US"/>
           </a:p>
@@ -2086,7 +2092,7 @@
           <a:p>
             <a:fld id="{B6CC3BC1-992D-1F43-98B1-8B8E610D7F7F}" type="datetimeFigureOut">
               <a:rPr kumimoji="1" lang="ko-Kore-DK" altLang="en-US" smtClean="0"/>
-              <a:t>12.12.2023</a:t>
+              <a:t>13.12.2023</a:t>
             </a:fld>
             <a:endParaRPr kumimoji="1" lang="ko-Kore-DK" altLang="en-US"/>
           </a:p>
@@ -2399,7 +2405,7 @@
           <a:p>
             <a:fld id="{B6CC3BC1-992D-1F43-98B1-8B8E610D7F7F}" type="datetimeFigureOut">
               <a:rPr kumimoji="1" lang="ko-Kore-DK" altLang="en-US" smtClean="0"/>
-              <a:t>12.12.2023</a:t>
+              <a:t>13.12.2023</a:t>
             </a:fld>
             <a:endParaRPr kumimoji="1" lang="ko-Kore-DK" altLang="en-US"/>
           </a:p>
@@ -2688,7 +2694,7 @@
           <a:p>
             <a:fld id="{B6CC3BC1-992D-1F43-98B1-8B8E610D7F7F}" type="datetimeFigureOut">
               <a:rPr kumimoji="1" lang="ko-Kore-DK" altLang="en-US" smtClean="0"/>
-              <a:t>12.12.2023</a:t>
+              <a:t>13.12.2023</a:t>
             </a:fld>
             <a:endParaRPr kumimoji="1" lang="ko-Kore-DK" altLang="en-US"/>
           </a:p>
@@ -2931,7 +2937,7 @@
           <a:p>
             <a:fld id="{B6CC3BC1-992D-1F43-98B1-8B8E610D7F7F}" type="datetimeFigureOut">
               <a:rPr kumimoji="1" lang="ko-Kore-DK" altLang="en-US" smtClean="0"/>
-              <a:t>12.12.2023</a:t>
+              <a:t>13.12.2023</a:t>
             </a:fld>
             <a:endParaRPr kumimoji="1" lang="ko-Kore-DK" altLang="en-US"/>
           </a:p>
@@ -3646,10 +3652,10 @@
       </p:sp>
       <p:pic>
         <p:nvPicPr>
-          <p:cNvPr id="7" name="그림 6">
-            <a:extLst>
-              <a:ext uri="{FF2B5EF4-FFF2-40B4-BE49-F238E27FC236}">
-                <a16:creationId xmlns:a16="http://schemas.microsoft.com/office/drawing/2014/main" id="{52B146DF-C94E-51AF-331F-9B49C208D968}"/>
+          <p:cNvPr id="5" name="그림 4" descr="텍스트, 폰트, 스크린샷, 타이포그래피이(가) 표시된 사진&#10;&#10;자동 생성된 설명">
+            <a:extLst>
+              <a:ext uri="{FF2B5EF4-FFF2-40B4-BE49-F238E27FC236}">
+                <a16:creationId xmlns:a16="http://schemas.microsoft.com/office/drawing/2014/main" id="{A441EE0C-2581-3D3F-711F-E51075B72F58}"/>
               </a:ext>
             </a:extLst>
           </p:cNvPr>
@@ -3666,14 +3672,252 @@
         </p:blipFill>
         <p:spPr>
           <a:xfrm>
-            <a:off x="1684920" y="3429000"/>
-            <a:ext cx="8822160" cy="1928341"/>
+            <a:off x="1120775" y="3171093"/>
+            <a:ext cx="3136900" cy="762000"/>
           </a:xfrm>
           <a:prstGeom prst="rect">
             <a:avLst/>
           </a:prstGeom>
         </p:spPr>
       </p:pic>
+      <p:pic>
+        <p:nvPicPr>
+          <p:cNvPr id="8" name="그림 7" descr="텍스트, 폰트, 스크린샷, 타이포그래피이(가) 표시된 사진&#10;&#10;자동 생성된 설명">
+            <a:extLst>
+              <a:ext uri="{FF2B5EF4-FFF2-40B4-BE49-F238E27FC236}">
+                <a16:creationId xmlns:a16="http://schemas.microsoft.com/office/drawing/2014/main" id="{FE1EE409-0B90-B49D-136C-D88F540AC61C}"/>
+              </a:ext>
+            </a:extLst>
+          </p:cNvPr>
+          <p:cNvPicPr>
+            <a:picLocks noChangeAspect="1"/>
+          </p:cNvPicPr>
+          <p:nvPr/>
+        </p:nvPicPr>
+        <p:blipFill>
+          <a:blip r:embed="rId3"/>
+          <a:stretch>
+            <a:fillRect/>
+          </a:stretch>
+        </p:blipFill>
+        <p:spPr>
+          <a:xfrm>
+            <a:off x="7947025" y="3171093"/>
+            <a:ext cx="3111500" cy="800100"/>
+          </a:xfrm>
+          <a:prstGeom prst="rect">
+            <a:avLst/>
+          </a:prstGeom>
+        </p:spPr>
+      </p:pic>
+      <p:pic>
+        <p:nvPicPr>
+          <p:cNvPr id="10" name="그림 9" descr="텍스트, 폰트, 스크린샷, 타이포그래피이(가) 표시된 사진&#10;&#10;자동 생성된 설명">
+            <a:extLst>
+              <a:ext uri="{FF2B5EF4-FFF2-40B4-BE49-F238E27FC236}">
+                <a16:creationId xmlns:a16="http://schemas.microsoft.com/office/drawing/2014/main" id="{E09EF391-D2EE-BD44-D92D-15263B87CF68}"/>
+              </a:ext>
+            </a:extLst>
+          </p:cNvPr>
+          <p:cNvPicPr>
+            <a:picLocks noChangeAspect="1"/>
+          </p:cNvPicPr>
+          <p:nvPr/>
+        </p:nvPicPr>
+        <p:blipFill>
+          <a:blip r:embed="rId4"/>
+          <a:stretch>
+            <a:fillRect/>
+          </a:stretch>
+        </p:blipFill>
+        <p:spPr>
+          <a:xfrm>
+            <a:off x="1120775" y="5125916"/>
+            <a:ext cx="3149600" cy="825500"/>
+          </a:xfrm>
+          <a:prstGeom prst="rect">
+            <a:avLst/>
+          </a:prstGeom>
+        </p:spPr>
+      </p:pic>
+      <p:pic>
+        <p:nvPicPr>
+          <p:cNvPr id="12" name="그림 11" descr="텍스트, 폰트, 스크린샷, 타이포그래피이(가) 표시된 사진&#10;&#10;자동 생성된 설명">
+            <a:extLst>
+              <a:ext uri="{FF2B5EF4-FFF2-40B4-BE49-F238E27FC236}">
+                <a16:creationId xmlns:a16="http://schemas.microsoft.com/office/drawing/2014/main" id="{ABB102D7-125B-59C2-B139-414B72CF6C69}"/>
+              </a:ext>
+            </a:extLst>
+          </p:cNvPr>
+          <p:cNvPicPr>
+            <a:picLocks noChangeAspect="1"/>
+          </p:cNvPicPr>
+          <p:nvPr/>
+        </p:nvPicPr>
+        <p:blipFill>
+          <a:blip r:embed="rId5"/>
+          <a:stretch>
+            <a:fillRect/>
+          </a:stretch>
+        </p:blipFill>
+        <p:spPr>
+          <a:xfrm>
+            <a:off x="7947025" y="5125916"/>
+            <a:ext cx="3136900" cy="800100"/>
+          </a:xfrm>
+          <a:prstGeom prst="rect">
+            <a:avLst/>
+          </a:prstGeom>
+        </p:spPr>
+      </p:pic>
+      <p:sp>
+        <p:nvSpPr>
+          <p:cNvPr id="13" name="TextBox 12">
+            <a:extLst>
+              <a:ext uri="{FF2B5EF4-FFF2-40B4-BE49-F238E27FC236}">
+                <a16:creationId xmlns:a16="http://schemas.microsoft.com/office/drawing/2014/main" id="{E68AB791-C801-4E3D-E58F-98589F8A8A87}"/>
+              </a:ext>
+            </a:extLst>
+          </p:cNvPr>
+          <p:cNvSpPr txBox="1"/>
+          <p:nvPr/>
+        </p:nvSpPr>
+        <p:spPr>
+          <a:xfrm>
+            <a:off x="1120775" y="4208585"/>
+            <a:ext cx="3136900" cy="369332"/>
+          </a:xfrm>
+          <a:prstGeom prst="rect">
+            <a:avLst/>
+          </a:prstGeom>
+          <a:noFill/>
+        </p:spPr>
+        <p:txBody>
+          <a:bodyPr wrap="square" rtlCol="0">
+            <a:spAutoFit/>
+          </a:bodyPr>
+          <a:lstStyle/>
+          <a:p>
+            <a:pPr algn="ctr"/>
+            <a:r>
+              <a:rPr kumimoji="1" lang="en-US" altLang="ko-Kore-DK" dirty="0"/>
+              <a:t>Worker 1</a:t>
+            </a:r>
+            <a:endParaRPr kumimoji="1" lang="ko-Kore-DK" altLang="en-US" dirty="0"/>
+          </a:p>
+        </p:txBody>
+      </p:sp>
+      <p:sp>
+        <p:nvSpPr>
+          <p:cNvPr id="14" name="TextBox 13">
+            <a:extLst>
+              <a:ext uri="{FF2B5EF4-FFF2-40B4-BE49-F238E27FC236}">
+                <a16:creationId xmlns:a16="http://schemas.microsoft.com/office/drawing/2014/main" id="{4BBC8B25-06E8-84CF-1265-CBAF348F8AB1}"/>
+              </a:ext>
+            </a:extLst>
+          </p:cNvPr>
+          <p:cNvSpPr txBox="1"/>
+          <p:nvPr/>
+        </p:nvSpPr>
+        <p:spPr>
+          <a:xfrm>
+            <a:off x="7947025" y="4208585"/>
+            <a:ext cx="3136900" cy="369332"/>
+          </a:xfrm>
+          <a:prstGeom prst="rect">
+            <a:avLst/>
+          </a:prstGeom>
+          <a:noFill/>
+        </p:spPr>
+        <p:txBody>
+          <a:bodyPr wrap="square" rtlCol="0">
+            <a:spAutoFit/>
+          </a:bodyPr>
+          <a:lstStyle/>
+          <a:p>
+            <a:pPr algn="ctr"/>
+            <a:r>
+              <a:rPr kumimoji="1" lang="en-US" altLang="ko-Kore-DK" dirty="0"/>
+              <a:t>Worker 2</a:t>
+            </a:r>
+            <a:endParaRPr kumimoji="1" lang="ko-Kore-DK" altLang="en-US" dirty="0"/>
+          </a:p>
+        </p:txBody>
+      </p:sp>
+      <p:sp>
+        <p:nvSpPr>
+          <p:cNvPr id="15" name="TextBox 14">
+            <a:extLst>
+              <a:ext uri="{FF2B5EF4-FFF2-40B4-BE49-F238E27FC236}">
+                <a16:creationId xmlns:a16="http://schemas.microsoft.com/office/drawing/2014/main" id="{36835258-1898-11DB-92D1-824256C04D90}"/>
+              </a:ext>
+            </a:extLst>
+          </p:cNvPr>
+          <p:cNvSpPr txBox="1"/>
+          <p:nvPr/>
+        </p:nvSpPr>
+        <p:spPr>
+          <a:xfrm>
+            <a:off x="1120775" y="6141421"/>
+            <a:ext cx="3136900" cy="369332"/>
+          </a:xfrm>
+          <a:prstGeom prst="rect">
+            <a:avLst/>
+          </a:prstGeom>
+          <a:noFill/>
+        </p:spPr>
+        <p:txBody>
+          <a:bodyPr wrap="square" rtlCol="0">
+            <a:spAutoFit/>
+          </a:bodyPr>
+          <a:lstStyle/>
+          <a:p>
+            <a:pPr algn="ctr"/>
+            <a:r>
+              <a:rPr kumimoji="1" lang="en-US" altLang="ko-Kore-DK" dirty="0"/>
+              <a:t>Worker 3</a:t>
+            </a:r>
+            <a:endParaRPr kumimoji="1" lang="ko-Kore-DK" altLang="en-US" dirty="0"/>
+          </a:p>
+        </p:txBody>
+      </p:sp>
+      <p:sp>
+        <p:nvSpPr>
+          <p:cNvPr id="16" name="TextBox 15">
+            <a:extLst>
+              <a:ext uri="{FF2B5EF4-FFF2-40B4-BE49-F238E27FC236}">
+                <a16:creationId xmlns:a16="http://schemas.microsoft.com/office/drawing/2014/main" id="{D8086414-287A-F026-9CB9-3C90EE4B0FD3}"/>
+              </a:ext>
+            </a:extLst>
+          </p:cNvPr>
+          <p:cNvSpPr txBox="1"/>
+          <p:nvPr/>
+        </p:nvSpPr>
+        <p:spPr>
+          <a:xfrm>
+            <a:off x="7921625" y="6110993"/>
+            <a:ext cx="3136900" cy="369332"/>
+          </a:xfrm>
+          <a:prstGeom prst="rect">
+            <a:avLst/>
+          </a:prstGeom>
+          <a:noFill/>
+        </p:spPr>
+        <p:txBody>
+          <a:bodyPr wrap="square" rtlCol="0">
+            <a:spAutoFit/>
+          </a:bodyPr>
+          <a:lstStyle/>
+          <a:p>
+            <a:pPr algn="ctr"/>
+            <a:r>
+              <a:rPr kumimoji="1" lang="en-US" altLang="ko-Kore-DK" dirty="0"/>
+              <a:t>Worker 4</a:t>
+            </a:r>
+            <a:endParaRPr kumimoji="1" lang="ko-Kore-DK" altLang="en-US" dirty="0"/>
+          </a:p>
+        </p:txBody>
+      </p:sp>
     </p:spTree>
     <p:extLst>
       <p:ext uri="{BB962C8B-B14F-4D97-AF65-F5344CB8AC3E}">
@@ -3706,10 +3950,39 @@
       </p:grpSpPr>
       <p:sp>
         <p:nvSpPr>
-          <p:cNvPr id="5" name="내용 개체 틀 2">
-            <a:extLst>
-              <a:ext uri="{FF2B5EF4-FFF2-40B4-BE49-F238E27FC236}">
-                <a16:creationId xmlns:a16="http://schemas.microsoft.com/office/drawing/2014/main" id="{C84EE2CD-D6DA-2880-7B93-9EEF39705BD1}"/>
+          <p:cNvPr id="2" name="제목 1">
+            <a:extLst>
+              <a:ext uri="{FF2B5EF4-FFF2-40B4-BE49-F238E27FC236}">
+                <a16:creationId xmlns:a16="http://schemas.microsoft.com/office/drawing/2014/main" id="{987AB91A-93D6-937F-3622-E9013D9491CE}"/>
+              </a:ext>
+            </a:extLst>
+          </p:cNvPr>
+          <p:cNvSpPr>
+            <a:spLocks noGrp="1"/>
+          </p:cNvSpPr>
+          <p:nvPr>
+            <p:ph type="title"/>
+          </p:nvPr>
+        </p:nvSpPr>
+        <p:spPr/>
+        <p:txBody>
+          <a:bodyPr/>
+          <a:lstStyle/>
+          <a:p>
+            <a:r>
+              <a:rPr kumimoji="1" lang="en-US" altLang="ko-Kore-DK" dirty="0"/>
+              <a:t>Test Result</a:t>
+            </a:r>
+            <a:endParaRPr kumimoji="1" lang="ko-Kore-DK" altLang="en-US" dirty="0"/>
+          </a:p>
+        </p:txBody>
+      </p:sp>
+      <p:sp>
+        <p:nvSpPr>
+          <p:cNvPr id="3" name="내용 개체 틀 2">
+            <a:extLst>
+              <a:ext uri="{FF2B5EF4-FFF2-40B4-BE49-F238E27FC236}">
+                <a16:creationId xmlns:a16="http://schemas.microsoft.com/office/drawing/2014/main" id="{23A94804-FB29-817A-42D8-DC12079A3372}"/>
               </a:ext>
             </a:extLst>
           </p:cNvPr>
@@ -3720,191 +3993,69 @@
             <p:ph idx="1"/>
           </p:nvPr>
         </p:nvSpPr>
+        <p:spPr/>
+        <p:txBody>
+          <a:bodyPr/>
+          <a:lstStyle/>
+          <a:p>
+            <a:r>
+              <a:rPr kumimoji="1" lang="en-US" altLang="ko-Kore-DK" dirty="0"/>
+              <a:t>By shell script(written by </a:t>
+            </a:r>
+            <a:r>
+              <a:rPr kumimoji="1" lang="en-US" altLang="ko-Kore-DK" dirty="0" err="1"/>
+              <a:t>github</a:t>
+            </a:r>
+            <a:r>
+              <a:rPr kumimoji="1" lang="en-US" altLang="ko-Kore-DK" dirty="0"/>
+              <a:t> copilot)</a:t>
+            </a:r>
+          </a:p>
+          <a:p>
+            <a:r>
+              <a:rPr kumimoji="1" lang="en-US" altLang="ko-Kore-DK" dirty="0"/>
+              <a:t>Check each worker’s integrity -&gt; checked whole workers</a:t>
+            </a:r>
+          </a:p>
+          <a:p>
+            <a:endParaRPr kumimoji="1" lang="ko-Kore-DK" altLang="en-US" dirty="0"/>
+          </a:p>
+        </p:txBody>
+      </p:sp>
+      <p:pic>
+        <p:nvPicPr>
+          <p:cNvPr id="7" name="그림 6">
+            <a:extLst>
+              <a:ext uri="{FF2B5EF4-FFF2-40B4-BE49-F238E27FC236}">
+                <a16:creationId xmlns:a16="http://schemas.microsoft.com/office/drawing/2014/main" id="{52B146DF-C94E-51AF-331F-9B49C208D968}"/>
+              </a:ext>
+            </a:extLst>
+          </p:cNvPr>
+          <p:cNvPicPr>
+            <a:picLocks noChangeAspect="1"/>
+          </p:cNvPicPr>
+          <p:nvPr/>
+        </p:nvPicPr>
+        <p:blipFill>
+          <a:blip r:embed="rId2"/>
+          <a:stretch>
+            <a:fillRect/>
+          </a:stretch>
+        </p:blipFill>
         <p:spPr>
           <a:xfrm>
-            <a:off x="838200" y="1825625"/>
-            <a:ext cx="10515600" cy="4351338"/>
+            <a:off x="1684920" y="3429000"/>
+            <a:ext cx="8822160" cy="1928341"/>
           </a:xfrm>
+          <a:prstGeom prst="rect">
+            <a:avLst/>
+          </a:prstGeom>
         </p:spPr>
-        <p:txBody>
-          <a:bodyPr>
-            <a:normAutofit fontScale="70000" lnSpcReduction="20000"/>
-          </a:bodyPr>
-          <a:lstStyle/>
-          <a:p>
-            <a:r>
-              <a:rPr kumimoji="1" lang="en" altLang="ko-Kore-DK" dirty="0"/>
-              <a:t>Milestone 1</a:t>
-            </a:r>
-          </a:p>
-          <a:p>
-            <a:pPr lvl="1"/>
-            <a:r>
-              <a:rPr kumimoji="1" lang="en" altLang="ko-Kore-DK" dirty="0"/>
-              <a:t>Generate input data - done</a:t>
-            </a:r>
-          </a:p>
-          <a:p>
-            <a:pPr lvl="1"/>
-            <a:r>
-              <a:rPr kumimoji="1" lang="en" altLang="ko-Kore-DK" dirty="0"/>
-              <a:t>Connect Master &amp; Worker nodes - done</a:t>
-            </a:r>
-          </a:p>
-          <a:p>
-            <a:pPr lvl="1"/>
-            <a:r>
-              <a:rPr kumimoji="1" lang="en" altLang="ko-Kore-DK" dirty="0"/>
-              <a:t>Configure </a:t>
-            </a:r>
-            <a:r>
-              <a:rPr kumimoji="1" lang="en" altLang="ko-Kore-DK" dirty="0" err="1"/>
-              <a:t>gRPC</a:t>
-            </a:r>
-            <a:r>
-              <a:rPr kumimoji="1" lang="en" altLang="ko-Kore-DK" dirty="0"/>
-              <a:t> - done</a:t>
-            </a:r>
-          </a:p>
-          <a:p>
-            <a:r>
-              <a:rPr kumimoji="1" lang="en" altLang="ko-Kore-DK" dirty="0"/>
-              <a:t>Milestone 2</a:t>
-            </a:r>
-          </a:p>
-          <a:p>
-            <a:pPr lvl="1"/>
-            <a:r>
-              <a:rPr kumimoji="1" lang="en" altLang="ko-Kore-DK" dirty="0"/>
-              <a:t>Worker samples data: done</a:t>
-            </a:r>
-          </a:p>
-          <a:p>
-            <a:pPr lvl="1"/>
-            <a:r>
-              <a:rPr kumimoji="1" lang="en" altLang="ko-Kore-DK" dirty="0"/>
-              <a:t>Master computes ranges for each worker nodes given worker's range -&gt; distribute it to workers with (range, </a:t>
-            </a:r>
-            <a:r>
-              <a:rPr kumimoji="1" lang="en" altLang="ko-Kore-DK" dirty="0" err="1"/>
-              <a:t>ipaddress</a:t>
-            </a:r>
-            <a:r>
-              <a:rPr kumimoji="1" lang="en" altLang="ko-Kore-DK" dirty="0"/>
-              <a:t>) list: done</a:t>
-            </a:r>
-          </a:p>
-          <a:p>
-            <a:pPr lvl="1"/>
-            <a:r>
-              <a:rPr kumimoji="1" lang="en" altLang="ko-Kore-DK" dirty="0">
-                <a:solidFill>
-                  <a:srgbClr val="FF0000"/>
-                </a:solidFill>
-              </a:rPr>
-              <a:t>Workers merge data : Moved from 3 to 2, done</a:t>
-            </a:r>
-          </a:p>
-          <a:p>
-            <a:pPr lvl="1"/>
-            <a:r>
-              <a:rPr kumimoji="1" lang="en" altLang="ko-Kore-DK" dirty="0">
-                <a:solidFill>
-                  <a:srgbClr val="FF0000"/>
-                </a:solidFill>
-              </a:rPr>
-              <a:t>Can execute(send) protocols in other, concurrently in Worker &amp; Master using future &amp; promise with dummy data, done</a:t>
-            </a:r>
-          </a:p>
-          <a:p>
-            <a:r>
-              <a:rPr kumimoji="1" lang="en" altLang="ko-Kore-DK" dirty="0"/>
-              <a:t>Milestone 3</a:t>
-            </a:r>
-          </a:p>
-          <a:p>
-            <a:pPr lvl="1"/>
-            <a:r>
-              <a:rPr kumimoji="1" lang="en" altLang="ko-Kore-DK" dirty="0"/>
-              <a:t>Workers sort and partition its data (should decide the size of partitioned file - done) - done</a:t>
-            </a:r>
-          </a:p>
-          <a:p>
-            <a:pPr lvl="1"/>
-            <a:r>
-              <a:rPr kumimoji="1" lang="en" altLang="ko-Kore-DK" dirty="0"/>
-              <a:t>Workers distribute its files to appropriate node range. - done</a:t>
-            </a:r>
-          </a:p>
-          <a:p>
-            <a:pPr lvl="1"/>
-            <a:r>
-              <a:rPr kumimoji="1" lang="en" altLang="ko-Kore-DK" dirty="0"/>
-              <a:t>Workers terminate &amp; notify master - done</a:t>
-            </a:r>
-          </a:p>
-          <a:p>
-            <a:pPr lvl="1"/>
-            <a:r>
-              <a:rPr kumimoji="1" lang="en" altLang="ko-Kore-DK" dirty="0">
-                <a:solidFill>
-                  <a:srgbClr val="FF0000"/>
-                </a:solidFill>
-              </a:rPr>
-              <a:t>Can execute(send) protocols in other, concurrently in Worker &amp; Master using future &amp; promise with real data (merge top-down &amp; bottom-up work) - done</a:t>
-            </a:r>
-          </a:p>
-          <a:p>
-            <a:pPr lvl="1"/>
-            <a:endParaRPr kumimoji="1" lang="en" altLang="ko-Kore-DK" dirty="0"/>
-          </a:p>
-          <a:p>
-            <a:pPr lvl="1"/>
-            <a:endParaRPr kumimoji="1" lang="en" altLang="ko-Kore-DK" dirty="0"/>
-          </a:p>
-          <a:p>
-            <a:endParaRPr kumimoji="1" lang="ko-Kore-DK" altLang="en-US" dirty="0"/>
-          </a:p>
-        </p:txBody>
-      </p:sp>
-      <p:sp>
-        <p:nvSpPr>
-          <p:cNvPr id="6" name="제목 1">
-            <a:extLst>
-              <a:ext uri="{FF2B5EF4-FFF2-40B4-BE49-F238E27FC236}">
-                <a16:creationId xmlns:a16="http://schemas.microsoft.com/office/drawing/2014/main" id="{F3DDE941-9F38-14AD-2697-FF874806C629}"/>
-              </a:ext>
-            </a:extLst>
-          </p:cNvPr>
-          <p:cNvSpPr>
-            <a:spLocks noGrp="1"/>
-          </p:cNvSpPr>
-          <p:nvPr>
-            <p:ph type="title"/>
-          </p:nvPr>
-        </p:nvSpPr>
-        <p:spPr>
-          <a:xfrm>
-            <a:off x="838200" y="365125"/>
-            <a:ext cx="10515600" cy="1325563"/>
-          </a:xfrm>
-        </p:spPr>
-        <p:txBody>
-          <a:bodyPr/>
-          <a:lstStyle/>
-          <a:p>
-            <a:r>
-              <a:rPr kumimoji="1" lang="en-US" altLang="ko-Kore-DK" dirty="0"/>
-              <a:t>Milestones</a:t>
-            </a:r>
-            <a:endParaRPr kumimoji="1" lang="ko-Kore-DK" altLang="en-US" dirty="0"/>
-          </a:p>
-        </p:txBody>
-      </p:sp>
+      </p:pic>
     </p:spTree>
     <p:extLst>
       <p:ext uri="{BB962C8B-B14F-4D97-AF65-F5344CB8AC3E}">
-        <p14:creationId xmlns:p14="http://schemas.microsoft.com/office/powerpoint/2010/main" val="1882502688"/>
+        <p14:creationId xmlns:p14="http://schemas.microsoft.com/office/powerpoint/2010/main" val="1977678807"/>
       </p:ext>
     </p:extLst>
   </p:cSld>
@@ -3933,10 +4084,173 @@
       </p:grpSpPr>
       <p:sp>
         <p:nvSpPr>
-          <p:cNvPr id="2" name="제목 1">
-            <a:extLst>
-              <a:ext uri="{FF2B5EF4-FFF2-40B4-BE49-F238E27FC236}">
-                <a16:creationId xmlns:a16="http://schemas.microsoft.com/office/drawing/2014/main" id="{4FF50346-CC2C-3127-65CB-C1000A3043E9}"/>
+          <p:cNvPr id="5" name="내용 개체 틀 2">
+            <a:extLst>
+              <a:ext uri="{FF2B5EF4-FFF2-40B4-BE49-F238E27FC236}">
+                <a16:creationId xmlns:a16="http://schemas.microsoft.com/office/drawing/2014/main" id="{C84EE2CD-D6DA-2880-7B93-9EEF39705BD1}"/>
+              </a:ext>
+            </a:extLst>
+          </p:cNvPr>
+          <p:cNvSpPr>
+            <a:spLocks noGrp="1"/>
+          </p:cNvSpPr>
+          <p:nvPr>
+            <p:ph idx="1"/>
+          </p:nvPr>
+        </p:nvSpPr>
+        <p:spPr>
+          <a:xfrm>
+            <a:off x="838200" y="1825625"/>
+            <a:ext cx="10515600" cy="4351338"/>
+          </a:xfrm>
+        </p:spPr>
+        <p:txBody>
+          <a:bodyPr>
+            <a:normAutofit fontScale="70000" lnSpcReduction="20000"/>
+          </a:bodyPr>
+          <a:lstStyle/>
+          <a:p>
+            <a:r>
+              <a:rPr kumimoji="1" lang="en" altLang="ko-Kore-DK" dirty="0"/>
+              <a:t>Milestone 1</a:t>
+            </a:r>
+          </a:p>
+          <a:p>
+            <a:pPr lvl="1"/>
+            <a:r>
+              <a:rPr kumimoji="1" lang="en" altLang="ko-Kore-DK" dirty="0"/>
+              <a:t>Generate input data - done</a:t>
+            </a:r>
+          </a:p>
+          <a:p>
+            <a:pPr lvl="1"/>
+            <a:r>
+              <a:rPr kumimoji="1" lang="en" altLang="ko-Kore-DK" dirty="0"/>
+              <a:t>Connect Master &amp; Worker nodes - done</a:t>
+            </a:r>
+          </a:p>
+          <a:p>
+            <a:pPr lvl="1"/>
+            <a:r>
+              <a:rPr kumimoji="1" lang="en" altLang="ko-Kore-DK" dirty="0"/>
+              <a:t>Configure </a:t>
+            </a:r>
+            <a:r>
+              <a:rPr kumimoji="1" lang="en" altLang="ko-Kore-DK" dirty="0" err="1"/>
+              <a:t>gRPC</a:t>
+            </a:r>
+            <a:r>
+              <a:rPr kumimoji="1" lang="en" altLang="ko-Kore-DK" dirty="0"/>
+              <a:t> - done</a:t>
+            </a:r>
+          </a:p>
+          <a:p>
+            <a:r>
+              <a:rPr kumimoji="1" lang="en" altLang="ko-Kore-DK" dirty="0"/>
+              <a:t>Milestone 2</a:t>
+            </a:r>
+          </a:p>
+          <a:p>
+            <a:pPr lvl="1"/>
+            <a:r>
+              <a:rPr kumimoji="1" lang="en" altLang="ko-Kore-DK" dirty="0"/>
+              <a:t>Worker samples data: done</a:t>
+            </a:r>
+          </a:p>
+          <a:p>
+            <a:pPr lvl="1"/>
+            <a:r>
+              <a:rPr kumimoji="1" lang="en" altLang="ko-Kore-DK" dirty="0"/>
+              <a:t>Master computes ranges for each worker nodes given worker's range -&gt; distribute it to workers with (range, </a:t>
+            </a:r>
+            <a:r>
+              <a:rPr kumimoji="1" lang="en" altLang="ko-Kore-DK" dirty="0" err="1"/>
+              <a:t>ipaddress</a:t>
+            </a:r>
+            <a:r>
+              <a:rPr kumimoji="1" lang="en" altLang="ko-Kore-DK" dirty="0"/>
+              <a:t>) list: done</a:t>
+            </a:r>
+          </a:p>
+          <a:p>
+            <a:pPr lvl="1"/>
+            <a:r>
+              <a:rPr kumimoji="1" lang="en" altLang="ko-Kore-DK" dirty="0">
+                <a:solidFill>
+                  <a:srgbClr val="FF0000"/>
+                </a:solidFill>
+              </a:rPr>
+              <a:t>Workers merge data : Moved from 3 to 2, done</a:t>
+            </a:r>
+          </a:p>
+          <a:p>
+            <a:pPr lvl="1"/>
+            <a:r>
+              <a:rPr kumimoji="1" lang="en" altLang="ko-Kore-DK" dirty="0">
+                <a:solidFill>
+                  <a:srgbClr val="FF0000"/>
+                </a:solidFill>
+              </a:rPr>
+              <a:t>Can execute(send) protocols in other, concurrently in Worker &amp; Master using future &amp; promise with dummy data, done</a:t>
+            </a:r>
+          </a:p>
+          <a:p>
+            <a:r>
+              <a:rPr kumimoji="1" lang="en" altLang="ko-Kore-DK" dirty="0"/>
+              <a:t>Milestone 3</a:t>
+            </a:r>
+          </a:p>
+          <a:p>
+            <a:pPr lvl="1"/>
+            <a:r>
+              <a:rPr kumimoji="1" lang="en" altLang="ko-Kore-DK" dirty="0"/>
+              <a:t>Workers sort and partition its data (should decide the size of partitioned file - done) - done</a:t>
+            </a:r>
+          </a:p>
+          <a:p>
+            <a:pPr lvl="1"/>
+            <a:r>
+              <a:rPr kumimoji="1" lang="en" altLang="ko-Kore-DK" dirty="0"/>
+              <a:t>Workers distribute its files to appropriate node range. - done</a:t>
+            </a:r>
+          </a:p>
+          <a:p>
+            <a:pPr lvl="1"/>
+            <a:r>
+              <a:rPr kumimoji="1" lang="en" altLang="ko-Kore-DK" dirty="0"/>
+              <a:t>Workers terminate &amp; notify master - done</a:t>
+            </a:r>
+          </a:p>
+          <a:p>
+            <a:pPr lvl="1"/>
+            <a:r>
+              <a:rPr kumimoji="1" lang="en" altLang="ko-Kore-DK" dirty="0">
+                <a:solidFill>
+                  <a:srgbClr val="FF0000"/>
+                </a:solidFill>
+              </a:rPr>
+              <a:t>Can execute(send) protocols in other, concurrently in Worker &amp; Master using future &amp; promise with real data (merge top-down &amp; bottom-up work) - done</a:t>
+            </a:r>
+          </a:p>
+          <a:p>
+            <a:pPr lvl="1"/>
+            <a:endParaRPr kumimoji="1" lang="en" altLang="ko-Kore-DK" dirty="0"/>
+          </a:p>
+          <a:p>
+            <a:pPr lvl="1"/>
+            <a:endParaRPr kumimoji="1" lang="en" altLang="ko-Kore-DK" dirty="0"/>
+          </a:p>
+          <a:p>
+            <a:endParaRPr kumimoji="1" lang="ko-Kore-DK" altLang="en-US" dirty="0"/>
+          </a:p>
+        </p:txBody>
+      </p:sp>
+      <p:sp>
+        <p:nvSpPr>
+          <p:cNvPr id="6" name="제목 1">
+            <a:extLst>
+              <a:ext uri="{FF2B5EF4-FFF2-40B4-BE49-F238E27FC236}">
+                <a16:creationId xmlns:a16="http://schemas.microsoft.com/office/drawing/2014/main" id="{F3DDE941-9F38-14AD-2697-FF874806C629}"/>
               </a:ext>
             </a:extLst>
           </p:cNvPr>
@@ -3947,79 +4261,28 @@
             <p:ph type="title"/>
           </p:nvPr>
         </p:nvSpPr>
-        <p:spPr/>
+        <p:spPr>
+          <a:xfrm>
+            <a:off x="838200" y="365125"/>
+            <a:ext cx="10515600" cy="1325563"/>
+          </a:xfrm>
+        </p:spPr>
         <p:txBody>
           <a:bodyPr/>
           <a:lstStyle/>
           <a:p>
             <a:r>
               <a:rPr kumimoji="1" lang="en-US" altLang="ko-Kore-DK" dirty="0"/>
-              <a:t>What we did</a:t>
+              <a:t>Milestones</a:t>
             </a:r>
             <a:endParaRPr kumimoji="1" lang="ko-Kore-DK" altLang="en-US" dirty="0"/>
-          </a:p>
-        </p:txBody>
-      </p:sp>
-      <p:sp>
-        <p:nvSpPr>
-          <p:cNvPr id="3" name="내용 개체 틀 2">
-            <a:extLst>
-              <a:ext uri="{FF2B5EF4-FFF2-40B4-BE49-F238E27FC236}">
-                <a16:creationId xmlns:a16="http://schemas.microsoft.com/office/drawing/2014/main" id="{DC5BF01F-820D-678C-1A43-14661BD1A869}"/>
-              </a:ext>
-            </a:extLst>
-          </p:cNvPr>
-          <p:cNvSpPr>
-            <a:spLocks noGrp="1"/>
-          </p:cNvSpPr>
-          <p:nvPr>
-            <p:ph idx="1"/>
-          </p:nvPr>
-        </p:nvSpPr>
-        <p:spPr/>
-        <p:txBody>
-          <a:bodyPr/>
-          <a:lstStyle/>
-          <a:p>
-            <a:r>
-              <a:rPr kumimoji="1" lang="en-US" altLang="ko-Kore-DK" dirty="0" err="1"/>
-              <a:t>Jeongho</a:t>
-            </a:r>
-            <a:r>
-              <a:rPr kumimoji="1" lang="en-US" altLang="ko-Kore-DK" dirty="0"/>
-              <a:t>: </a:t>
-            </a:r>
-          </a:p>
-          <a:p>
-            <a:r>
-              <a:rPr kumimoji="1" lang="en-US" altLang="ko-Kore-DK"/>
-              <a:t>Overall design</a:t>
-            </a:r>
-          </a:p>
-          <a:p>
-            <a:r>
-              <a:rPr kumimoji="1" lang="en-US" altLang="ko-Kore-DK" dirty="0"/>
-              <a:t>Master/Worker general control/communication flow</a:t>
-            </a:r>
-          </a:p>
-          <a:p>
-            <a:r>
-              <a:rPr kumimoji="1" lang="en-US" altLang="ko-Kore-DK" dirty="0"/>
-              <a:t>Local sorting</a:t>
-            </a:r>
-          </a:p>
-          <a:p>
-            <a:r>
-              <a:rPr kumimoji="1" lang="en-US" altLang="ko-Kore-DK" dirty="0"/>
-              <a:t>Attach sample/merge logics</a:t>
-            </a:r>
           </a:p>
         </p:txBody>
       </p:sp>
     </p:spTree>
     <p:extLst>
       <p:ext uri="{BB962C8B-B14F-4D97-AF65-F5344CB8AC3E}">
-        <p14:creationId xmlns:p14="http://schemas.microsoft.com/office/powerpoint/2010/main" val="26706673"/>
+        <p14:creationId xmlns:p14="http://schemas.microsoft.com/office/powerpoint/2010/main" val="1882502688"/>
       </p:ext>
     </p:extLst>
   </p:cSld>
@@ -4051,6 +4314,121 @@
           <p:cNvPr id="2" name="제목 1">
             <a:extLst>
               <a:ext uri="{FF2B5EF4-FFF2-40B4-BE49-F238E27FC236}">
+                <a16:creationId xmlns:a16="http://schemas.microsoft.com/office/drawing/2014/main" id="{4FF50346-CC2C-3127-65CB-C1000A3043E9}"/>
+              </a:ext>
+            </a:extLst>
+          </p:cNvPr>
+          <p:cNvSpPr>
+            <a:spLocks noGrp="1"/>
+          </p:cNvSpPr>
+          <p:nvPr>
+            <p:ph type="title"/>
+          </p:nvPr>
+        </p:nvSpPr>
+        <p:spPr/>
+        <p:txBody>
+          <a:bodyPr/>
+          <a:lstStyle/>
+          <a:p>
+            <a:r>
+              <a:rPr kumimoji="1" lang="en-US" altLang="ko-Kore-DK" dirty="0"/>
+              <a:t>What we did</a:t>
+            </a:r>
+            <a:endParaRPr kumimoji="1" lang="ko-Kore-DK" altLang="en-US" dirty="0"/>
+          </a:p>
+        </p:txBody>
+      </p:sp>
+      <p:sp>
+        <p:nvSpPr>
+          <p:cNvPr id="3" name="내용 개체 틀 2">
+            <a:extLst>
+              <a:ext uri="{FF2B5EF4-FFF2-40B4-BE49-F238E27FC236}">
+                <a16:creationId xmlns:a16="http://schemas.microsoft.com/office/drawing/2014/main" id="{DC5BF01F-820D-678C-1A43-14661BD1A869}"/>
+              </a:ext>
+            </a:extLst>
+          </p:cNvPr>
+          <p:cNvSpPr>
+            <a:spLocks noGrp="1"/>
+          </p:cNvSpPr>
+          <p:nvPr>
+            <p:ph idx="1"/>
+          </p:nvPr>
+        </p:nvSpPr>
+        <p:spPr/>
+        <p:txBody>
+          <a:bodyPr/>
+          <a:lstStyle/>
+          <a:p>
+            <a:r>
+              <a:rPr kumimoji="1" lang="en-US" altLang="ko-Kore-DK" dirty="0" err="1"/>
+              <a:t>Jeongho</a:t>
+            </a:r>
+            <a:r>
+              <a:rPr kumimoji="1" lang="en-US" altLang="ko-Kore-DK" dirty="0"/>
+              <a:t>: </a:t>
+            </a:r>
+          </a:p>
+          <a:p>
+            <a:r>
+              <a:rPr kumimoji="1" lang="en-US" altLang="ko-Kore-DK"/>
+              <a:t>Overall design</a:t>
+            </a:r>
+          </a:p>
+          <a:p>
+            <a:r>
+              <a:rPr kumimoji="1" lang="en-US" altLang="ko-Kore-DK" dirty="0"/>
+              <a:t>Master/Worker general control/communication flow</a:t>
+            </a:r>
+          </a:p>
+          <a:p>
+            <a:r>
+              <a:rPr kumimoji="1" lang="en-US" altLang="ko-Kore-DK" dirty="0"/>
+              <a:t>Local sorting</a:t>
+            </a:r>
+          </a:p>
+          <a:p>
+            <a:r>
+              <a:rPr kumimoji="1" lang="en-US" altLang="ko-Kore-DK" dirty="0"/>
+              <a:t>Attach sample/merge logics</a:t>
+            </a:r>
+          </a:p>
+        </p:txBody>
+      </p:sp>
+    </p:spTree>
+    <p:extLst>
+      <p:ext uri="{BB962C8B-B14F-4D97-AF65-F5344CB8AC3E}">
+        <p14:creationId xmlns:p14="http://schemas.microsoft.com/office/powerpoint/2010/main" val="26706673"/>
+      </p:ext>
+    </p:extLst>
+  </p:cSld>
+  <p:clrMapOvr>
+    <a:masterClrMapping/>
+  </p:clrMapOvr>
+</p:sld>
+</file>
+
+<file path=ppt/slides/slide7.xml><?xml version="1.0" encoding="utf-8"?>
+<p:sld xmlns:a="http://schemas.openxmlformats.org/drawingml/2006/main" xmlns:r="http://schemas.openxmlformats.org/officeDocument/2006/relationships" xmlns:p="http://schemas.openxmlformats.org/presentationml/2006/main">
+  <p:cSld>
+    <p:spTree>
+      <p:nvGrpSpPr>
+        <p:cNvPr id="1" name=""/>
+        <p:cNvGrpSpPr/>
+        <p:nvPr/>
+      </p:nvGrpSpPr>
+      <p:grpSpPr>
+        <a:xfrm>
+          <a:off x="0" y="0"/>
+          <a:ext cx="0" cy="0"/>
+          <a:chOff x="0" y="0"/>
+          <a:chExt cx="0" cy="0"/>
+        </a:xfrm>
+      </p:grpSpPr>
+      <p:sp>
+        <p:nvSpPr>
+          <p:cNvPr id="2" name="제목 1">
+            <a:extLst>
+              <a:ext uri="{FF2B5EF4-FFF2-40B4-BE49-F238E27FC236}">
                 <a16:creationId xmlns:a16="http://schemas.microsoft.com/office/drawing/2014/main" id="{7622BF70-7183-1F4B-77D1-C5935A3C122D}"/>
               </a:ext>
             </a:extLst>
@@ -4139,7 +4517,7 @@
 </p:sld>
 </file>
 
-<file path=ppt/slides/slide7.xml><?xml version="1.0" encoding="utf-8"?>
+<file path=ppt/slides/slide8.xml><?xml version="1.0" encoding="utf-8"?>
 <p:sld xmlns:a="http://schemas.openxmlformats.org/drawingml/2006/main" xmlns:r="http://schemas.openxmlformats.org/officeDocument/2006/relationships" xmlns:p="http://schemas.openxmlformats.org/presentationml/2006/main">
   <p:cSld>
     <p:spTree>

</xml_diff>

<commit_message>
docs: modify final presentation ppt
</commit_message>
<xml_diff>
--- a/docs/Final Presentation.pptx
+++ b/docs/Final Presentation.pptx
@@ -12,10 +12,16 @@
     <p:sldId id="259" r:id="rId6"/>
     <p:sldId id="260" r:id="rId7"/>
     <p:sldId id="262" r:id="rId8"/>
-    <p:sldId id="270" r:id="rId9"/>
-    <p:sldId id="281" r:id="rId10"/>
-    <p:sldId id="265" r:id="rId11"/>
-    <p:sldId id="261" r:id="rId12"/>
+    <p:sldId id="282" r:id="rId9"/>
+    <p:sldId id="270" r:id="rId10"/>
+    <p:sldId id="281" r:id="rId11"/>
+    <p:sldId id="284" r:id="rId12"/>
+    <p:sldId id="283" r:id="rId13"/>
+    <p:sldId id="285" r:id="rId14"/>
+    <p:sldId id="286" r:id="rId15"/>
+    <p:sldId id="287" r:id="rId16"/>
+    <p:sldId id="265" r:id="rId17"/>
+    <p:sldId id="261" r:id="rId18"/>
   </p:sldIdLst>
   <p:sldSz cx="12192000" cy="6858000"/>
   <p:notesSz cx="6858000" cy="9144000"/>
@@ -271,7 +277,7 @@
           <a:p>
             <a:fld id="{B6CC3BC1-992D-1F43-98B1-8B8E610D7F7F}" type="datetimeFigureOut">
               <a:rPr kumimoji="1" lang="ko-Kore-DK" altLang="en-US" smtClean="0"/>
-              <a:t>14.12.2023</a:t>
+              <a:t>12/14/23</a:t>
             </a:fld>
             <a:endParaRPr kumimoji="1" lang="ko-Kore-DK" altLang="en-US"/>
           </a:p>
@@ -471,7 +477,7 @@
           <a:p>
             <a:fld id="{B6CC3BC1-992D-1F43-98B1-8B8E610D7F7F}" type="datetimeFigureOut">
               <a:rPr kumimoji="1" lang="ko-Kore-DK" altLang="en-US" smtClean="0"/>
-              <a:t>14.12.2023</a:t>
+              <a:t>12/14/23</a:t>
             </a:fld>
             <a:endParaRPr kumimoji="1" lang="ko-Kore-DK" altLang="en-US"/>
           </a:p>
@@ -681,7 +687,7 @@
           <a:p>
             <a:fld id="{B6CC3BC1-992D-1F43-98B1-8B8E610D7F7F}" type="datetimeFigureOut">
               <a:rPr kumimoji="1" lang="ko-Kore-DK" altLang="en-US" smtClean="0"/>
-              <a:t>14.12.2023</a:t>
+              <a:t>12/14/23</a:t>
             </a:fld>
             <a:endParaRPr kumimoji="1" lang="ko-Kore-DK" altLang="en-US"/>
           </a:p>
@@ -881,7 +887,7 @@
           <a:p>
             <a:fld id="{B6CC3BC1-992D-1F43-98B1-8B8E610D7F7F}" type="datetimeFigureOut">
               <a:rPr kumimoji="1" lang="ko-Kore-DK" altLang="en-US" smtClean="0"/>
-              <a:t>14.12.2023</a:t>
+              <a:t>12/14/23</a:t>
             </a:fld>
             <a:endParaRPr kumimoji="1" lang="ko-Kore-DK" altLang="en-US"/>
           </a:p>
@@ -1157,7 +1163,7 @@
           <a:p>
             <a:fld id="{B6CC3BC1-992D-1F43-98B1-8B8E610D7F7F}" type="datetimeFigureOut">
               <a:rPr kumimoji="1" lang="ko-Kore-DK" altLang="en-US" smtClean="0"/>
-              <a:t>14.12.2023</a:t>
+              <a:t>12/14/23</a:t>
             </a:fld>
             <a:endParaRPr kumimoji="1" lang="ko-Kore-DK" altLang="en-US"/>
           </a:p>
@@ -1425,7 +1431,7 @@
           <a:p>
             <a:fld id="{B6CC3BC1-992D-1F43-98B1-8B8E610D7F7F}" type="datetimeFigureOut">
               <a:rPr kumimoji="1" lang="ko-Kore-DK" altLang="en-US" smtClean="0"/>
-              <a:t>14.12.2023</a:t>
+              <a:t>12/14/23</a:t>
             </a:fld>
             <a:endParaRPr kumimoji="1" lang="ko-Kore-DK" altLang="en-US"/>
           </a:p>
@@ -1840,7 +1846,7 @@
           <a:p>
             <a:fld id="{B6CC3BC1-992D-1F43-98B1-8B8E610D7F7F}" type="datetimeFigureOut">
               <a:rPr kumimoji="1" lang="ko-Kore-DK" altLang="en-US" smtClean="0"/>
-              <a:t>14.12.2023</a:t>
+              <a:t>12/14/23</a:t>
             </a:fld>
             <a:endParaRPr kumimoji="1" lang="ko-Kore-DK" altLang="en-US"/>
           </a:p>
@@ -1982,7 +1988,7 @@
           <a:p>
             <a:fld id="{B6CC3BC1-992D-1F43-98B1-8B8E610D7F7F}" type="datetimeFigureOut">
               <a:rPr kumimoji="1" lang="ko-Kore-DK" altLang="en-US" smtClean="0"/>
-              <a:t>14.12.2023</a:t>
+              <a:t>12/14/23</a:t>
             </a:fld>
             <a:endParaRPr kumimoji="1" lang="ko-Kore-DK" altLang="en-US"/>
           </a:p>
@@ -2095,7 +2101,7 @@
           <a:p>
             <a:fld id="{B6CC3BC1-992D-1F43-98B1-8B8E610D7F7F}" type="datetimeFigureOut">
               <a:rPr kumimoji="1" lang="ko-Kore-DK" altLang="en-US" smtClean="0"/>
-              <a:t>14.12.2023</a:t>
+              <a:t>12/14/23</a:t>
             </a:fld>
             <a:endParaRPr kumimoji="1" lang="ko-Kore-DK" altLang="en-US"/>
           </a:p>
@@ -2408,7 +2414,7 @@
           <a:p>
             <a:fld id="{B6CC3BC1-992D-1F43-98B1-8B8E610D7F7F}" type="datetimeFigureOut">
               <a:rPr kumimoji="1" lang="ko-Kore-DK" altLang="en-US" smtClean="0"/>
-              <a:t>14.12.2023</a:t>
+              <a:t>12/14/23</a:t>
             </a:fld>
             <a:endParaRPr kumimoji="1" lang="ko-Kore-DK" altLang="en-US"/>
           </a:p>
@@ -2697,7 +2703,7 @@
           <a:p>
             <a:fld id="{B6CC3BC1-992D-1F43-98B1-8B8E610D7F7F}" type="datetimeFigureOut">
               <a:rPr kumimoji="1" lang="ko-Kore-DK" altLang="en-US" smtClean="0"/>
-              <a:t>14.12.2023</a:t>
+              <a:t>12/14/23</a:t>
             </a:fld>
             <a:endParaRPr kumimoji="1" lang="ko-Kore-DK" altLang="en-US"/>
           </a:p>
@@ -2940,7 +2946,7 @@
           <a:p>
             <a:fld id="{B6CC3BC1-992D-1F43-98B1-8B8E610D7F7F}" type="datetimeFigureOut">
               <a:rPr kumimoji="1" lang="ko-Kore-DK" altLang="en-US" smtClean="0"/>
-              <a:t>14.12.2023</a:t>
+              <a:t>12/14/23</a:t>
             </a:fld>
             <a:endParaRPr kumimoji="1" lang="ko-Kore-DK" altLang="en-US"/>
           </a:p>
@@ -3446,10 +3452,10 @@
       </p:grpSpPr>
       <p:sp>
         <p:nvSpPr>
-          <p:cNvPr id="2" name="제목 1">
-            <a:extLst>
-              <a:ext uri="{FF2B5EF4-FFF2-40B4-BE49-F238E27FC236}">
-                <a16:creationId xmlns:a16="http://schemas.microsoft.com/office/drawing/2014/main" id="{A9C9D23E-5AF7-9FB7-EA2F-0BED102EEC0C}"/>
+          <p:cNvPr id="2" name="Title 1">
+            <a:extLst>
+              <a:ext uri="{FF2B5EF4-FFF2-40B4-BE49-F238E27FC236}">
+                <a16:creationId xmlns:a16="http://schemas.microsoft.com/office/drawing/2014/main" id="{AE9E209F-E715-7E31-5C4C-64EE31BC4F1A}"/>
               </a:ext>
             </a:extLst>
           </p:cNvPr>
@@ -3466,116 +3472,120 @@
           <a:lstStyle/>
           <a:p>
             <a:r>
-              <a:rPr kumimoji="1" lang="en-US" altLang="ko-Kore-DK" dirty="0"/>
-              <a:t>Design Remarks</a:t>
-            </a:r>
-            <a:endParaRPr kumimoji="1" lang="ko-Kore-DK" altLang="en-US" dirty="0"/>
-          </a:p>
-        </p:txBody>
-      </p:sp>
-      <p:sp>
-        <p:nvSpPr>
-          <p:cNvPr id="3" name="내용 개체 틀 2">
-            <a:extLst>
-              <a:ext uri="{FF2B5EF4-FFF2-40B4-BE49-F238E27FC236}">
-                <a16:creationId xmlns:a16="http://schemas.microsoft.com/office/drawing/2014/main" id="{6589F9DD-10C4-D57D-0DF9-AC174B71245E}"/>
-              </a:ext>
-            </a:extLst>
-          </p:cNvPr>
-          <p:cNvSpPr>
-            <a:spLocks noGrp="1"/>
-          </p:cNvSpPr>
+              <a:rPr lang="en-US" dirty="0"/>
+              <a:t>Worker</a:t>
+            </a:r>
+          </a:p>
+        </p:txBody>
+      </p:sp>
+      <p:sp>
+        <p:nvSpPr>
+          <p:cNvPr id="6" name="TextBox 5">
+            <a:extLst>
+              <a:ext uri="{FF2B5EF4-FFF2-40B4-BE49-F238E27FC236}">
+                <a16:creationId xmlns:a16="http://schemas.microsoft.com/office/drawing/2014/main" id="{D718BF41-F549-D26B-5422-F0E221C7FB88}"/>
+              </a:ext>
+            </a:extLst>
+          </p:cNvPr>
+          <p:cNvSpPr txBox="1"/>
+          <p:nvPr/>
+        </p:nvSpPr>
+        <p:spPr>
+          <a:xfrm>
+            <a:off x="7867859" y="1874728"/>
+            <a:ext cx="4170066" cy="3539430"/>
+          </a:xfrm>
+          <a:prstGeom prst="rect">
+            <a:avLst/>
+          </a:prstGeom>
+          <a:noFill/>
+        </p:spPr>
+        <p:txBody>
+          <a:bodyPr wrap="square" rtlCol="0">
+            <a:spAutoFit/>
+          </a:bodyPr>
+          <a:lstStyle/>
+          <a:p>
+            <a:r>
+              <a:rPr lang="en-US" sz="2800" dirty="0"/>
+              <a:t>Pink: </a:t>
+            </a:r>
+            <a:r>
+              <a:rPr lang="en-US" sz="2800" dirty="0" err="1"/>
+              <a:t>gRPC</a:t>
+            </a:r>
+            <a:r>
+              <a:rPr lang="en-US" sz="2800" dirty="0"/>
+              <a:t> Service</a:t>
+            </a:r>
+          </a:p>
+          <a:p>
+            <a:endParaRPr lang="en-US" sz="2800" dirty="0"/>
+          </a:p>
+          <a:p>
+            <a:r>
+              <a:rPr lang="en-US" sz="2800" dirty="0"/>
+              <a:t>Black: Promise(or Future)</a:t>
+            </a:r>
+          </a:p>
+          <a:p>
+            <a:endParaRPr lang="en-US" sz="2800" dirty="0"/>
+          </a:p>
+          <a:p>
+            <a:r>
+              <a:rPr lang="en-US" sz="2800" dirty="0"/>
+              <a:t>Purple: function returning Future[Unit]</a:t>
+            </a:r>
+          </a:p>
+          <a:p>
+            <a:endParaRPr lang="en-US" sz="2800" dirty="0"/>
+          </a:p>
+          <a:p>
+            <a:r>
+              <a:rPr lang="en-US" sz="2800" dirty="0"/>
+              <a:t>Blue: Result of </a:t>
+            </a:r>
+            <a:r>
+              <a:rPr lang="en-US" sz="2800" dirty="0" err="1"/>
+              <a:t>Await.Result</a:t>
+            </a:r>
+            <a:endParaRPr lang="en-US" sz="2800" dirty="0"/>
+          </a:p>
+        </p:txBody>
+      </p:sp>
+      <p:pic>
+        <p:nvPicPr>
+          <p:cNvPr id="8" name="Content Placeholder 7" descr="A diagram of a process&#10;&#10;Description automatically generated">
+            <a:extLst>
+              <a:ext uri="{FF2B5EF4-FFF2-40B4-BE49-F238E27FC236}">
+                <a16:creationId xmlns:a16="http://schemas.microsoft.com/office/drawing/2014/main" id="{BA3971E5-9CEC-D0D6-1C16-578DF1D100CF}"/>
+              </a:ext>
+            </a:extLst>
+          </p:cNvPr>
+          <p:cNvPicPr>
+            <a:picLocks noGrp="1" noChangeAspect="1"/>
+          </p:cNvPicPr>
           <p:nvPr>
             <p:ph idx="1"/>
           </p:nvPr>
-        </p:nvSpPr>
-        <p:spPr/>
-        <p:txBody>
-          <a:bodyPr/>
-          <a:lstStyle/>
-          <a:p>
-            <a:r>
-              <a:rPr kumimoji="1" lang="en-US" altLang="ko-Kore-DK" dirty="0"/>
-              <a:t>Control states as future &amp; promise to schedule the overall flow</a:t>
-            </a:r>
-          </a:p>
-          <a:p>
-            <a:r>
-              <a:rPr kumimoji="1" lang="en-US" altLang="ko-Kore-DK" dirty="0" err="1"/>
-              <a:t>Sort&amp;Sample</a:t>
-            </a:r>
-            <a:r>
-              <a:rPr kumimoji="1" lang="en-US" altLang="ko-Kore-DK" dirty="0"/>
-              <a:t> before register to the master</a:t>
-            </a:r>
-          </a:p>
-          <a:p>
-            <a:r>
-              <a:rPr kumimoji="1" lang="en-US" altLang="ko-Kore-DK" dirty="0"/>
-              <a:t>Separate </a:t>
-            </a:r>
-            <a:r>
-              <a:rPr kumimoji="1" lang="en-US" altLang="ko-Kore-DK" dirty="0" err="1"/>
-              <a:t>DistributeStart</a:t>
-            </a:r>
-            <a:r>
-              <a:rPr kumimoji="1" lang="en-US" altLang="ko-Kore-DK" dirty="0"/>
-              <a:t>/</a:t>
-            </a:r>
-            <a:r>
-              <a:rPr kumimoji="1" lang="en-US" altLang="ko-Kore-DK" dirty="0" err="1"/>
-              <a:t>DistributeFinish</a:t>
-            </a:r>
-            <a:r>
-              <a:rPr kumimoji="1" lang="en-US" altLang="ko-Kore-DK" dirty="0"/>
-              <a:t> &amp; </a:t>
-            </a:r>
-            <a:r>
-              <a:rPr kumimoji="1" lang="en-US" altLang="ko-Kore-DK" dirty="0" err="1"/>
-              <a:t>SortStart</a:t>
-            </a:r>
-            <a:r>
-              <a:rPr kumimoji="1" lang="en-US" altLang="ko-Kore-DK" dirty="0"/>
-              <a:t>/</a:t>
-            </a:r>
-            <a:r>
-              <a:rPr kumimoji="1" lang="en-US" altLang="ko-Kore-DK" dirty="0" err="1"/>
-              <a:t>SortFinish</a:t>
-            </a:r>
-            <a:r>
-              <a:rPr kumimoji="1" lang="en-US" altLang="ko-Kore-DK" dirty="0"/>
-              <a:t> requests so that the distribution and sorting(merging) does not happen in the </a:t>
-            </a:r>
-            <a:r>
-              <a:rPr kumimoji="1" lang="en-US" altLang="ko-Kore-DK" dirty="0" err="1"/>
-              <a:t>httpclient’s</a:t>
-            </a:r>
-            <a:r>
-              <a:rPr kumimoji="1" lang="en-US" altLang="ko-Kore-DK" dirty="0"/>
-              <a:t> request-response context</a:t>
-            </a:r>
-          </a:p>
-          <a:p>
-            <a:r>
-              <a:rPr kumimoji="1" lang="en-US" altLang="ko-Kore-DK" dirty="0"/>
-              <a:t>Decided the size of </a:t>
-            </a:r>
-            <a:r>
-              <a:rPr kumimoji="1" lang="en-US" altLang="ko-Kore-DK" dirty="0" err="1"/>
-              <a:t>temp&amp;output</a:t>
-            </a:r>
-            <a:r>
-              <a:rPr kumimoji="1" lang="en-US" altLang="ko-Kore-DK" dirty="0"/>
-              <a:t> files as 2MB, because of OOM error during file save</a:t>
-            </a:r>
-            <a:endParaRPr kumimoji="1" lang="ko-Kore-DK" altLang="en-US" dirty="0"/>
-          </a:p>
-        </p:txBody>
-      </p:sp>
+        </p:nvPicPr>
+        <p:blipFill>
+          <a:blip r:embed="rId2"/>
+          <a:stretch>
+            <a:fillRect/>
+          </a:stretch>
+        </p:blipFill>
+        <p:spPr>
+          <a:xfrm>
+            <a:off x="154075" y="1765640"/>
+            <a:ext cx="7713784" cy="3757606"/>
+          </a:xfrm>
+        </p:spPr>
+      </p:pic>
     </p:spTree>
     <p:extLst>
       <p:ext uri="{BB962C8B-B14F-4D97-AF65-F5344CB8AC3E}">
-        <p14:creationId xmlns:p14="http://schemas.microsoft.com/office/powerpoint/2010/main" val="3485952277"/>
+        <p14:creationId xmlns:p14="http://schemas.microsoft.com/office/powerpoint/2010/main" val="1280205688"/>
       </p:ext>
     </p:extLst>
   </p:cSld>
@@ -3602,6 +3612,1342 @@
           <a:chExt cx="0" cy="0"/>
         </a:xfrm>
       </p:grpSpPr>
+      <p:pic>
+        <p:nvPicPr>
+          <p:cNvPr id="4" name="Content Placeholder 7" descr="A diagram of a process&#10;&#10;Description automatically generated">
+            <a:extLst>
+              <a:ext uri="{FF2B5EF4-FFF2-40B4-BE49-F238E27FC236}">
+                <a16:creationId xmlns:a16="http://schemas.microsoft.com/office/drawing/2014/main" id="{0B1C0138-5441-15EB-3DF2-CABD9C8B0769}"/>
+              </a:ext>
+            </a:extLst>
+          </p:cNvPr>
+          <p:cNvPicPr>
+            <a:picLocks noGrp="1" noChangeAspect="1"/>
+          </p:cNvPicPr>
+          <p:nvPr>
+            <p:ph idx="1"/>
+          </p:nvPr>
+        </p:nvPicPr>
+        <p:blipFill rotWithShape="1">
+          <a:blip r:embed="rId2"/>
+          <a:srcRect l="19604" r="39098" b="70432"/>
+          <a:stretch/>
+        </p:blipFill>
+        <p:spPr>
+          <a:xfrm>
+            <a:off x="0" y="1578137"/>
+            <a:ext cx="3185652" cy="1111045"/>
+          </a:xfrm>
+        </p:spPr>
+      </p:pic>
+      <p:pic>
+        <p:nvPicPr>
+          <p:cNvPr id="5" name="Content Placeholder 7" descr="A diagram of a process&#10;&#10;Description automatically generated">
+            <a:extLst>
+              <a:ext uri="{FF2B5EF4-FFF2-40B4-BE49-F238E27FC236}">
+                <a16:creationId xmlns:a16="http://schemas.microsoft.com/office/drawing/2014/main" id="{CE366FC7-DD26-7494-0336-501BCD14FF99}"/>
+              </a:ext>
+            </a:extLst>
+          </p:cNvPr>
+          <p:cNvPicPr>
+            <a:picLocks noChangeAspect="1"/>
+          </p:cNvPicPr>
+          <p:nvPr/>
+        </p:nvPicPr>
+        <p:blipFill rotWithShape="1">
+          <a:blip r:embed="rId2"/>
+          <a:srcRect t="32054" r="20170" b="35762"/>
+          <a:stretch/>
+        </p:blipFill>
+        <p:spPr>
+          <a:xfrm>
+            <a:off x="0" y="3392206"/>
+            <a:ext cx="5663381" cy="1112250"/>
+          </a:xfrm>
+          <a:prstGeom prst="rect">
+            <a:avLst/>
+          </a:prstGeom>
+        </p:spPr>
+      </p:pic>
+      <p:pic>
+        <p:nvPicPr>
+          <p:cNvPr id="6" name="Content Placeholder 7" descr="A diagram of a process&#10;&#10;Description automatically generated">
+            <a:extLst>
+              <a:ext uri="{FF2B5EF4-FFF2-40B4-BE49-F238E27FC236}">
+                <a16:creationId xmlns:a16="http://schemas.microsoft.com/office/drawing/2014/main" id="{F01AC040-279F-4285-2DA4-9B918F631711}"/>
+              </a:ext>
+            </a:extLst>
+          </p:cNvPr>
+          <p:cNvPicPr>
+            <a:picLocks noChangeAspect="1"/>
+          </p:cNvPicPr>
+          <p:nvPr/>
+        </p:nvPicPr>
+        <p:blipFill rotWithShape="1">
+          <a:blip r:embed="rId2"/>
+          <a:srcRect t="67815"/>
+          <a:stretch/>
+        </p:blipFill>
+        <p:spPr>
+          <a:xfrm>
+            <a:off x="0" y="5092133"/>
+            <a:ext cx="7170611" cy="1124209"/>
+          </a:xfrm>
+          <a:prstGeom prst="rect">
+            <a:avLst/>
+          </a:prstGeom>
+        </p:spPr>
+      </p:pic>
+      <p:sp>
+        <p:nvSpPr>
+          <p:cNvPr id="7" name="TextBox 6">
+            <a:extLst>
+              <a:ext uri="{FF2B5EF4-FFF2-40B4-BE49-F238E27FC236}">
+                <a16:creationId xmlns:a16="http://schemas.microsoft.com/office/drawing/2014/main" id="{8C6B20EC-6B99-94C0-C170-669197A21BB8}"/>
+              </a:ext>
+            </a:extLst>
+          </p:cNvPr>
+          <p:cNvSpPr txBox="1"/>
+          <p:nvPr/>
+        </p:nvSpPr>
+        <p:spPr>
+          <a:xfrm>
+            <a:off x="1809710" y="344129"/>
+            <a:ext cx="1639965" cy="646331"/>
+          </a:xfrm>
+          <a:prstGeom prst="rect">
+            <a:avLst/>
+          </a:prstGeom>
+          <a:noFill/>
+        </p:spPr>
+        <p:txBody>
+          <a:bodyPr wrap="square" rtlCol="0">
+            <a:spAutoFit/>
+          </a:bodyPr>
+          <a:lstStyle/>
+          <a:p>
+            <a:r>
+              <a:rPr lang="en-US" sz="3600" dirty="0">
+                <a:latin typeface="+mj-lt"/>
+              </a:rPr>
+              <a:t>worker</a:t>
+            </a:r>
+          </a:p>
+        </p:txBody>
+      </p:sp>
+      <p:sp>
+        <p:nvSpPr>
+          <p:cNvPr id="8" name="TextBox 7">
+            <a:extLst>
+              <a:ext uri="{FF2B5EF4-FFF2-40B4-BE49-F238E27FC236}">
+                <a16:creationId xmlns:a16="http://schemas.microsoft.com/office/drawing/2014/main" id="{9E1E58FC-759F-3079-5218-AC4C92A4A9F8}"/>
+              </a:ext>
+            </a:extLst>
+          </p:cNvPr>
+          <p:cNvSpPr txBox="1"/>
+          <p:nvPr/>
+        </p:nvSpPr>
+        <p:spPr>
+          <a:xfrm>
+            <a:off x="8536422" y="344129"/>
+            <a:ext cx="1639965" cy="646331"/>
+          </a:xfrm>
+          <a:prstGeom prst="rect">
+            <a:avLst/>
+          </a:prstGeom>
+          <a:noFill/>
+        </p:spPr>
+        <p:txBody>
+          <a:bodyPr wrap="square" rtlCol="0">
+            <a:spAutoFit/>
+          </a:bodyPr>
+          <a:lstStyle/>
+          <a:p>
+            <a:r>
+              <a:rPr lang="en-US" sz="3600" dirty="0">
+                <a:latin typeface="+mj-lt"/>
+              </a:rPr>
+              <a:t>master</a:t>
+            </a:r>
+          </a:p>
+        </p:txBody>
+      </p:sp>
+      <p:pic>
+        <p:nvPicPr>
+          <p:cNvPr id="12" name="Content Placeholder 4" descr="A diagram of a work flow&#10;&#10;Description automatically generated">
+            <a:extLst>
+              <a:ext uri="{FF2B5EF4-FFF2-40B4-BE49-F238E27FC236}">
+                <a16:creationId xmlns:a16="http://schemas.microsoft.com/office/drawing/2014/main" id="{D3F79F44-D74E-A7C3-B689-7A5903831950}"/>
+              </a:ext>
+            </a:extLst>
+          </p:cNvPr>
+          <p:cNvPicPr>
+            <a:picLocks noChangeAspect="1"/>
+          </p:cNvPicPr>
+          <p:nvPr/>
+        </p:nvPicPr>
+        <p:blipFill rotWithShape="1">
+          <a:blip r:embed="rId3"/>
+          <a:srcRect b="53892"/>
+          <a:stretch/>
+        </p:blipFill>
+        <p:spPr>
+          <a:xfrm>
+            <a:off x="6096000" y="1090200"/>
+            <a:ext cx="6096000" cy="2119920"/>
+          </a:xfrm>
+          <a:prstGeom prst="rect">
+            <a:avLst/>
+          </a:prstGeom>
+        </p:spPr>
+      </p:pic>
+      <p:pic>
+        <p:nvPicPr>
+          <p:cNvPr id="13" name="Content Placeholder 4" descr="A diagram of a work flow&#10;&#10;Description automatically generated">
+            <a:extLst>
+              <a:ext uri="{FF2B5EF4-FFF2-40B4-BE49-F238E27FC236}">
+                <a16:creationId xmlns:a16="http://schemas.microsoft.com/office/drawing/2014/main" id="{1603BA81-B5E4-C7CC-1337-784A7EF7385A}"/>
+              </a:ext>
+            </a:extLst>
+          </p:cNvPr>
+          <p:cNvPicPr>
+            <a:picLocks noChangeAspect="1"/>
+          </p:cNvPicPr>
+          <p:nvPr/>
+        </p:nvPicPr>
+        <p:blipFill rotWithShape="1">
+          <a:blip r:embed="rId3"/>
+          <a:srcRect t="46703" b="28143"/>
+          <a:stretch/>
+        </p:blipFill>
+        <p:spPr>
+          <a:xfrm>
+            <a:off x="6096000" y="3372385"/>
+            <a:ext cx="6096000" cy="1156511"/>
+          </a:xfrm>
+          <a:prstGeom prst="rect">
+            <a:avLst/>
+          </a:prstGeom>
+        </p:spPr>
+      </p:pic>
+      <p:pic>
+        <p:nvPicPr>
+          <p:cNvPr id="14" name="Content Placeholder 4" descr="A diagram of a work flow&#10;&#10;Description automatically generated">
+            <a:extLst>
+              <a:ext uri="{FF2B5EF4-FFF2-40B4-BE49-F238E27FC236}">
+                <a16:creationId xmlns:a16="http://schemas.microsoft.com/office/drawing/2014/main" id="{7BB3A73D-C676-540D-74AF-DDD36E372CBB}"/>
+              </a:ext>
+            </a:extLst>
+          </p:cNvPr>
+          <p:cNvPicPr>
+            <a:picLocks noChangeAspect="1"/>
+          </p:cNvPicPr>
+          <p:nvPr/>
+        </p:nvPicPr>
+        <p:blipFill rotWithShape="1">
+          <a:blip r:embed="rId3"/>
+          <a:srcRect t="75928" r="25615"/>
+          <a:stretch/>
+        </p:blipFill>
+        <p:spPr>
+          <a:xfrm>
+            <a:off x="7541342" y="5092133"/>
+            <a:ext cx="4650658" cy="1135114"/>
+          </a:xfrm>
+          <a:prstGeom prst="rect">
+            <a:avLst/>
+          </a:prstGeom>
+        </p:spPr>
+      </p:pic>
+      <p:cxnSp>
+        <p:nvCxnSpPr>
+          <p:cNvPr id="16" name="Straight Arrow Connector 15">
+            <a:extLst>
+              <a:ext uri="{FF2B5EF4-FFF2-40B4-BE49-F238E27FC236}">
+                <a16:creationId xmlns:a16="http://schemas.microsoft.com/office/drawing/2014/main" id="{AD994D61-9158-B32A-EDE9-88F8F0FFB669}"/>
+              </a:ext>
+            </a:extLst>
+          </p:cNvPr>
+          <p:cNvCxnSpPr>
+            <a:cxnSpLocks/>
+            <a:stCxn id="4" idx="3"/>
+            <a:endCxn id="12" idx="1"/>
+          </p:cNvCxnSpPr>
+          <p:nvPr/>
+        </p:nvCxnSpPr>
+        <p:spPr>
+          <a:xfrm>
+            <a:off x="3185652" y="2133660"/>
+            <a:ext cx="2910348" cy="16500"/>
+          </a:xfrm>
+          <a:prstGeom prst="straightConnector1">
+            <a:avLst/>
+          </a:prstGeom>
+          <a:ln w="38100">
+            <a:solidFill>
+              <a:schemeClr val="tx1">
+                <a:lumMod val="95000"/>
+                <a:lumOff val="5000"/>
+                <a:alpha val="50000"/>
+              </a:schemeClr>
+            </a:solidFill>
+            <a:tailEnd type="triangle"/>
+          </a:ln>
+        </p:spPr>
+        <p:style>
+          <a:lnRef idx="1">
+            <a:schemeClr val="accent1"/>
+          </a:lnRef>
+          <a:fillRef idx="0">
+            <a:schemeClr val="accent1"/>
+          </a:fillRef>
+          <a:effectRef idx="0">
+            <a:schemeClr val="accent1"/>
+          </a:effectRef>
+          <a:fontRef idx="minor">
+            <a:schemeClr val="tx1"/>
+          </a:fontRef>
+        </p:style>
+      </p:cxnSp>
+      <p:cxnSp>
+        <p:nvCxnSpPr>
+          <p:cNvPr id="17" name="Straight Arrow Connector 16">
+            <a:extLst>
+              <a:ext uri="{FF2B5EF4-FFF2-40B4-BE49-F238E27FC236}">
+                <a16:creationId xmlns:a16="http://schemas.microsoft.com/office/drawing/2014/main" id="{0F5DBCCD-84D9-E4B8-0D1B-CB08507588ED}"/>
+              </a:ext>
+            </a:extLst>
+          </p:cNvPr>
+          <p:cNvCxnSpPr>
+            <a:cxnSpLocks/>
+            <a:endCxn id="13" idx="1"/>
+          </p:cNvCxnSpPr>
+          <p:nvPr/>
+        </p:nvCxnSpPr>
+        <p:spPr>
+          <a:xfrm>
+            <a:off x="5663381" y="3948331"/>
+            <a:ext cx="432619" cy="2310"/>
+          </a:xfrm>
+          <a:prstGeom prst="straightConnector1">
+            <a:avLst/>
+          </a:prstGeom>
+          <a:ln w="38100">
+            <a:solidFill>
+              <a:schemeClr val="tx1">
+                <a:alpha val="50000"/>
+              </a:schemeClr>
+            </a:solidFill>
+            <a:tailEnd type="triangle"/>
+          </a:ln>
+        </p:spPr>
+        <p:style>
+          <a:lnRef idx="1">
+            <a:schemeClr val="accent1"/>
+          </a:lnRef>
+          <a:fillRef idx="0">
+            <a:schemeClr val="accent1"/>
+          </a:fillRef>
+          <a:effectRef idx="0">
+            <a:schemeClr val="accent1"/>
+          </a:effectRef>
+          <a:fontRef idx="minor">
+            <a:schemeClr val="tx1"/>
+          </a:fontRef>
+        </p:style>
+      </p:cxnSp>
+      <p:cxnSp>
+        <p:nvCxnSpPr>
+          <p:cNvPr id="19" name="Straight Arrow Connector 18">
+            <a:extLst>
+              <a:ext uri="{FF2B5EF4-FFF2-40B4-BE49-F238E27FC236}">
+                <a16:creationId xmlns:a16="http://schemas.microsoft.com/office/drawing/2014/main" id="{A8734276-F0C3-1D7B-606E-12E4BE57B08A}"/>
+              </a:ext>
+            </a:extLst>
+          </p:cNvPr>
+          <p:cNvCxnSpPr>
+            <a:cxnSpLocks/>
+            <a:stCxn id="6" idx="3"/>
+            <a:endCxn id="14" idx="1"/>
+          </p:cNvCxnSpPr>
+          <p:nvPr/>
+        </p:nvCxnSpPr>
+        <p:spPr>
+          <a:xfrm>
+            <a:off x="7170611" y="5654238"/>
+            <a:ext cx="370731" cy="5452"/>
+          </a:xfrm>
+          <a:prstGeom prst="straightConnector1">
+            <a:avLst/>
+          </a:prstGeom>
+          <a:ln w="38100">
+            <a:solidFill>
+              <a:schemeClr val="tx1">
+                <a:alpha val="50000"/>
+              </a:schemeClr>
+            </a:solidFill>
+            <a:tailEnd type="triangle"/>
+          </a:ln>
+        </p:spPr>
+        <p:style>
+          <a:lnRef idx="1">
+            <a:schemeClr val="accent1"/>
+          </a:lnRef>
+          <a:fillRef idx="0">
+            <a:schemeClr val="accent1"/>
+          </a:fillRef>
+          <a:effectRef idx="0">
+            <a:schemeClr val="accent1"/>
+          </a:effectRef>
+          <a:fontRef idx="minor">
+            <a:schemeClr val="tx1"/>
+          </a:fontRef>
+        </p:style>
+      </p:cxnSp>
+      <p:cxnSp>
+        <p:nvCxnSpPr>
+          <p:cNvPr id="24" name="Straight Arrow Connector 23">
+            <a:extLst>
+              <a:ext uri="{FF2B5EF4-FFF2-40B4-BE49-F238E27FC236}">
+                <a16:creationId xmlns:a16="http://schemas.microsoft.com/office/drawing/2014/main" id="{DCC91A1F-B6C4-3241-9A56-BB60B0101B96}"/>
+              </a:ext>
+            </a:extLst>
+          </p:cNvPr>
+          <p:cNvCxnSpPr>
+            <a:cxnSpLocks/>
+            <a:stCxn id="12" idx="3"/>
+            <a:endCxn id="5" idx="1"/>
+          </p:cNvCxnSpPr>
+          <p:nvPr/>
+        </p:nvCxnSpPr>
+        <p:spPr>
+          <a:xfrm flipH="1">
+            <a:off x="0" y="2150160"/>
+            <a:ext cx="12192000" cy="1798171"/>
+          </a:xfrm>
+          <a:prstGeom prst="straightConnector1">
+            <a:avLst/>
+          </a:prstGeom>
+          <a:ln w="38100">
+            <a:solidFill>
+              <a:schemeClr val="tx1">
+                <a:lumMod val="95000"/>
+                <a:lumOff val="5000"/>
+                <a:alpha val="50000"/>
+              </a:schemeClr>
+            </a:solidFill>
+            <a:tailEnd type="triangle"/>
+          </a:ln>
+        </p:spPr>
+        <p:style>
+          <a:lnRef idx="1">
+            <a:schemeClr val="accent1"/>
+          </a:lnRef>
+          <a:fillRef idx="0">
+            <a:schemeClr val="accent1"/>
+          </a:fillRef>
+          <a:effectRef idx="0">
+            <a:schemeClr val="accent1"/>
+          </a:effectRef>
+          <a:fontRef idx="minor">
+            <a:schemeClr val="tx1"/>
+          </a:fontRef>
+        </p:style>
+      </p:cxnSp>
+      <p:cxnSp>
+        <p:nvCxnSpPr>
+          <p:cNvPr id="27" name="Straight Arrow Connector 26">
+            <a:extLst>
+              <a:ext uri="{FF2B5EF4-FFF2-40B4-BE49-F238E27FC236}">
+                <a16:creationId xmlns:a16="http://schemas.microsoft.com/office/drawing/2014/main" id="{0A6F47A0-689A-01C8-1F04-F11DCE74EFB3}"/>
+              </a:ext>
+            </a:extLst>
+          </p:cNvPr>
+          <p:cNvCxnSpPr>
+            <a:cxnSpLocks/>
+            <a:stCxn id="13" idx="3"/>
+            <a:endCxn id="6" idx="1"/>
+          </p:cNvCxnSpPr>
+          <p:nvPr/>
+        </p:nvCxnSpPr>
+        <p:spPr>
+          <a:xfrm flipH="1">
+            <a:off x="0" y="3950641"/>
+            <a:ext cx="12192000" cy="1703597"/>
+          </a:xfrm>
+          <a:prstGeom prst="straightConnector1">
+            <a:avLst/>
+          </a:prstGeom>
+          <a:ln w="38100">
+            <a:solidFill>
+              <a:schemeClr val="tx1">
+                <a:alpha val="50000"/>
+              </a:schemeClr>
+            </a:solidFill>
+            <a:tailEnd type="triangle"/>
+          </a:ln>
+        </p:spPr>
+        <p:style>
+          <a:lnRef idx="1">
+            <a:schemeClr val="accent1"/>
+          </a:lnRef>
+          <a:fillRef idx="0">
+            <a:schemeClr val="accent1"/>
+          </a:fillRef>
+          <a:effectRef idx="0">
+            <a:schemeClr val="accent1"/>
+          </a:effectRef>
+          <a:fontRef idx="minor">
+            <a:schemeClr val="tx1"/>
+          </a:fontRef>
+        </p:style>
+      </p:cxnSp>
+    </p:spTree>
+    <p:extLst>
+      <p:ext uri="{BB962C8B-B14F-4D97-AF65-F5344CB8AC3E}">
+        <p14:creationId xmlns:p14="http://schemas.microsoft.com/office/powerpoint/2010/main" val="124464580"/>
+      </p:ext>
+    </p:extLst>
+  </p:cSld>
+  <p:clrMapOvr>
+    <a:masterClrMapping/>
+  </p:clrMapOvr>
+</p:sld>
+</file>
+
+<file path=ppt/slides/slide12.xml><?xml version="1.0" encoding="utf-8"?>
+<p:sld xmlns:a="http://schemas.openxmlformats.org/drawingml/2006/main" xmlns:r="http://schemas.openxmlformats.org/officeDocument/2006/relationships" xmlns:p="http://schemas.openxmlformats.org/presentationml/2006/main">
+  <p:cSld>
+    <p:spTree>
+      <p:nvGrpSpPr>
+        <p:cNvPr id="1" name=""/>
+        <p:cNvGrpSpPr/>
+        <p:nvPr/>
+      </p:nvGrpSpPr>
+      <p:grpSpPr>
+        <a:xfrm>
+          <a:off x="0" y="0"/>
+          <a:ext cx="0" cy="0"/>
+          <a:chOff x="0" y="0"/>
+          <a:chExt cx="0" cy="0"/>
+        </a:xfrm>
+      </p:grpSpPr>
+      <p:pic>
+        <p:nvPicPr>
+          <p:cNvPr id="5" name="Content Placeholder 4">
+            <a:extLst>
+              <a:ext uri="{FF2B5EF4-FFF2-40B4-BE49-F238E27FC236}">
+                <a16:creationId xmlns:a16="http://schemas.microsoft.com/office/drawing/2014/main" id="{F5B9FFBD-991C-50F1-BFB5-A1F8D494B7CE}"/>
+              </a:ext>
+            </a:extLst>
+          </p:cNvPr>
+          <p:cNvPicPr>
+            <a:picLocks noGrp="1" noChangeAspect="1"/>
+          </p:cNvPicPr>
+          <p:nvPr>
+            <p:ph idx="1"/>
+          </p:nvPr>
+        </p:nvPicPr>
+        <p:blipFill>
+          <a:blip r:embed="rId2"/>
+          <a:stretch>
+            <a:fillRect/>
+          </a:stretch>
+        </p:blipFill>
+        <p:spPr>
+          <a:xfrm>
+            <a:off x="0" y="134134"/>
+            <a:ext cx="5951589" cy="233396"/>
+          </a:xfrm>
+          <a:prstGeom prst="rect">
+            <a:avLst/>
+          </a:prstGeom>
+        </p:spPr>
+      </p:pic>
+      <p:pic>
+        <p:nvPicPr>
+          <p:cNvPr id="4" name="Picture 3">
+            <a:extLst>
+              <a:ext uri="{FF2B5EF4-FFF2-40B4-BE49-F238E27FC236}">
+                <a16:creationId xmlns:a16="http://schemas.microsoft.com/office/drawing/2014/main" id="{A3FC2D1E-4059-040F-C500-10F5498D4068}"/>
+              </a:ext>
+            </a:extLst>
+          </p:cNvPr>
+          <p:cNvPicPr>
+            <a:picLocks noChangeAspect="1"/>
+          </p:cNvPicPr>
+          <p:nvPr/>
+        </p:nvPicPr>
+        <p:blipFill>
+          <a:blip r:embed="rId3"/>
+          <a:stretch>
+            <a:fillRect/>
+          </a:stretch>
+        </p:blipFill>
+        <p:spPr>
+          <a:xfrm>
+            <a:off x="5670755" y="5520769"/>
+            <a:ext cx="6521245" cy="1203097"/>
+          </a:xfrm>
+          <a:prstGeom prst="rect">
+            <a:avLst/>
+          </a:prstGeom>
+        </p:spPr>
+      </p:pic>
+      <p:pic>
+        <p:nvPicPr>
+          <p:cNvPr id="6" name="Picture 5">
+            <a:extLst>
+              <a:ext uri="{FF2B5EF4-FFF2-40B4-BE49-F238E27FC236}">
+                <a16:creationId xmlns:a16="http://schemas.microsoft.com/office/drawing/2014/main" id="{4F341D2E-74E8-2129-73C6-C6E6F70A8493}"/>
+              </a:ext>
+            </a:extLst>
+          </p:cNvPr>
+          <p:cNvPicPr>
+            <a:picLocks noChangeAspect="1"/>
+          </p:cNvPicPr>
+          <p:nvPr/>
+        </p:nvPicPr>
+        <p:blipFill>
+          <a:blip r:embed="rId4"/>
+          <a:stretch>
+            <a:fillRect/>
+          </a:stretch>
+        </p:blipFill>
+        <p:spPr>
+          <a:xfrm>
+            <a:off x="0" y="446553"/>
+            <a:ext cx="6641133" cy="4880749"/>
+          </a:xfrm>
+          <a:prstGeom prst="rect">
+            <a:avLst/>
+          </a:prstGeom>
+        </p:spPr>
+      </p:pic>
+      <p:sp>
+        <p:nvSpPr>
+          <p:cNvPr id="7" name="TextBox 6">
+            <a:extLst>
+              <a:ext uri="{FF2B5EF4-FFF2-40B4-BE49-F238E27FC236}">
+                <a16:creationId xmlns:a16="http://schemas.microsoft.com/office/drawing/2014/main" id="{C862A6B9-959C-81B3-3FC9-47AE99180B35}"/>
+              </a:ext>
+            </a:extLst>
+          </p:cNvPr>
+          <p:cNvSpPr txBox="1"/>
+          <p:nvPr/>
+        </p:nvSpPr>
+        <p:spPr>
+          <a:xfrm>
+            <a:off x="6924263" y="1765929"/>
+            <a:ext cx="4601497" cy="1754326"/>
+          </a:xfrm>
+          <a:prstGeom prst="rect">
+            <a:avLst/>
+          </a:prstGeom>
+          <a:noFill/>
+        </p:spPr>
+        <p:txBody>
+          <a:bodyPr wrap="square" rtlCol="0">
+            <a:spAutoFit/>
+          </a:bodyPr>
+          <a:lstStyle/>
+          <a:p>
+            <a:r>
+              <a:rPr lang="en-US" dirty="0"/>
+              <a:t>Shuffling is done in </a:t>
+            </a:r>
+            <a:r>
+              <a:rPr lang="en-US" dirty="0" err="1"/>
+              <a:t>sendDistribute</a:t>
+            </a:r>
+            <a:r>
+              <a:rPr lang="en-US" dirty="0"/>
+              <a:t>. </a:t>
+            </a:r>
+            <a:r>
+              <a:rPr lang="en-US" dirty="0" err="1"/>
+              <a:t>sendDistribute</a:t>
+            </a:r>
+            <a:r>
+              <a:rPr lang="en-US" dirty="0"/>
+              <a:t> sends distribute requests.</a:t>
+            </a:r>
+          </a:p>
+          <a:p>
+            <a:endParaRPr lang="en-US" dirty="0"/>
+          </a:p>
+          <a:p>
+            <a:r>
+              <a:rPr lang="en-US" dirty="0"/>
+              <a:t>When worker receives a distribute request(containing records less than 2MB), it simply saves the records as a file.</a:t>
+            </a:r>
+          </a:p>
+        </p:txBody>
+      </p:sp>
+      <p:sp>
+        <p:nvSpPr>
+          <p:cNvPr id="8" name="TextBox 7">
+            <a:extLst>
+              <a:ext uri="{FF2B5EF4-FFF2-40B4-BE49-F238E27FC236}">
+                <a16:creationId xmlns:a16="http://schemas.microsoft.com/office/drawing/2014/main" id="{41772EED-C3A9-D544-1061-3FD9DEFEB680}"/>
+              </a:ext>
+            </a:extLst>
+          </p:cNvPr>
+          <p:cNvSpPr txBox="1"/>
+          <p:nvPr/>
+        </p:nvSpPr>
+        <p:spPr>
+          <a:xfrm>
+            <a:off x="6924263" y="504098"/>
+            <a:ext cx="4454013" cy="646331"/>
+          </a:xfrm>
+          <a:prstGeom prst="rect">
+            <a:avLst/>
+          </a:prstGeom>
+          <a:noFill/>
+        </p:spPr>
+        <p:txBody>
+          <a:bodyPr wrap="square" rtlCol="0">
+            <a:spAutoFit/>
+          </a:bodyPr>
+          <a:lstStyle/>
+          <a:p>
+            <a:r>
+              <a:rPr lang="en-US" sz="3600" dirty="0">
+                <a:latin typeface="+mj-lt"/>
+              </a:rPr>
+              <a:t>Distribute(Shuffling)</a:t>
+            </a:r>
+          </a:p>
+        </p:txBody>
+      </p:sp>
+    </p:spTree>
+    <p:extLst>
+      <p:ext uri="{BB962C8B-B14F-4D97-AF65-F5344CB8AC3E}">
+        <p14:creationId xmlns:p14="http://schemas.microsoft.com/office/powerpoint/2010/main" val="3908817981"/>
+      </p:ext>
+    </p:extLst>
+  </p:cSld>
+  <p:clrMapOvr>
+    <a:masterClrMapping/>
+  </p:clrMapOvr>
+</p:sld>
+</file>
+
+<file path=ppt/slides/slide13.xml><?xml version="1.0" encoding="utf-8"?>
+<p:sld xmlns:a="http://schemas.openxmlformats.org/drawingml/2006/main" xmlns:r="http://schemas.openxmlformats.org/officeDocument/2006/relationships" xmlns:p="http://schemas.openxmlformats.org/presentationml/2006/main">
+  <p:cSld>
+    <p:spTree>
+      <p:nvGrpSpPr>
+        <p:cNvPr id="1" name=""/>
+        <p:cNvGrpSpPr/>
+        <p:nvPr/>
+      </p:nvGrpSpPr>
+      <p:grpSpPr>
+        <a:xfrm>
+          <a:off x="0" y="0"/>
+          <a:ext cx="0" cy="0"/>
+          <a:chOff x="0" y="0"/>
+          <a:chExt cx="0" cy="0"/>
+        </a:xfrm>
+      </p:grpSpPr>
+      <p:sp>
+        <p:nvSpPr>
+          <p:cNvPr id="2" name="Title 1">
+            <a:extLst>
+              <a:ext uri="{FF2B5EF4-FFF2-40B4-BE49-F238E27FC236}">
+                <a16:creationId xmlns:a16="http://schemas.microsoft.com/office/drawing/2014/main" id="{05ADEFF4-1BC5-BDD9-0C02-3EEC229675A1}"/>
+              </a:ext>
+            </a:extLst>
+          </p:cNvPr>
+          <p:cNvSpPr>
+            <a:spLocks noGrp="1"/>
+          </p:cNvSpPr>
+          <p:nvPr>
+            <p:ph type="title"/>
+          </p:nvPr>
+        </p:nvSpPr>
+        <p:spPr/>
+        <p:txBody>
+          <a:bodyPr/>
+          <a:lstStyle/>
+          <a:p>
+            <a:r>
+              <a:rPr lang="en-US" dirty="0"/>
+              <a:t>Merging</a:t>
+            </a:r>
+          </a:p>
+        </p:txBody>
+      </p:sp>
+      <p:sp>
+        <p:nvSpPr>
+          <p:cNvPr id="3" name="Content Placeholder 2">
+            <a:extLst>
+              <a:ext uri="{FF2B5EF4-FFF2-40B4-BE49-F238E27FC236}">
+                <a16:creationId xmlns:a16="http://schemas.microsoft.com/office/drawing/2014/main" id="{B36FA355-A660-45F1-9587-9E853D09A9D8}"/>
+              </a:ext>
+            </a:extLst>
+          </p:cNvPr>
+          <p:cNvSpPr>
+            <a:spLocks noGrp="1"/>
+          </p:cNvSpPr>
+          <p:nvPr>
+            <p:ph idx="1"/>
+          </p:nvPr>
+        </p:nvSpPr>
+        <p:spPr/>
+        <p:txBody>
+          <a:bodyPr/>
+          <a:lstStyle/>
+          <a:p>
+            <a:pPr marL="0" indent="0">
+              <a:buNone/>
+            </a:pPr>
+            <a:r>
+              <a:rPr lang="en-US" dirty="0"/>
+              <a:t>Need to merge “m” sorted records(files) into 1 sorted records.</a:t>
+            </a:r>
+          </a:p>
+          <a:p>
+            <a:pPr marL="0" indent="0">
+              <a:buNone/>
+            </a:pPr>
+            <a:r>
+              <a:rPr lang="en-US" dirty="0"/>
+              <a:t>Let there are total ”n” records</a:t>
+            </a:r>
+          </a:p>
+          <a:p>
+            <a:pPr marL="0" indent="0">
+              <a:buNone/>
+            </a:pPr>
+            <a:r>
+              <a:rPr lang="en-US" dirty="0"/>
+              <a:t>Basic way will me to compare m times for each record O(</a:t>
+            </a:r>
+            <a:r>
+              <a:rPr lang="en-US" dirty="0" err="1"/>
+              <a:t>mn</a:t>
+            </a:r>
+            <a:r>
+              <a:rPr lang="en-US" dirty="0"/>
+              <a:t>)</a:t>
+            </a:r>
+          </a:p>
+          <a:p>
+            <a:pPr marL="0" indent="0">
+              <a:buNone/>
+            </a:pPr>
+            <a:r>
+              <a:rPr lang="en-US" dirty="0"/>
+              <a:t>We used tournament tree O(n log m)</a:t>
+            </a:r>
+          </a:p>
+          <a:p>
+            <a:pPr marL="0" indent="0">
+              <a:buNone/>
+            </a:pPr>
+            <a:r>
+              <a:rPr lang="en-US" dirty="0"/>
+              <a:t>For files of total 2GB, m is 1000. The difference gets bigger as the total size increases</a:t>
+            </a:r>
+          </a:p>
+          <a:p>
+            <a:pPr marL="0" indent="0">
+              <a:buNone/>
+            </a:pPr>
+            <a:endParaRPr lang="en-US" dirty="0"/>
+          </a:p>
+        </p:txBody>
+      </p:sp>
+    </p:spTree>
+    <p:extLst>
+      <p:ext uri="{BB962C8B-B14F-4D97-AF65-F5344CB8AC3E}">
+        <p14:creationId xmlns:p14="http://schemas.microsoft.com/office/powerpoint/2010/main" val="1423354341"/>
+      </p:ext>
+    </p:extLst>
+  </p:cSld>
+  <p:clrMapOvr>
+    <a:masterClrMapping/>
+  </p:clrMapOvr>
+</p:sld>
+</file>
+
+<file path=ppt/slides/slide14.xml><?xml version="1.0" encoding="utf-8"?>
+<p:sld xmlns:a="http://schemas.openxmlformats.org/drawingml/2006/main" xmlns:r="http://schemas.openxmlformats.org/officeDocument/2006/relationships" xmlns:p="http://schemas.openxmlformats.org/presentationml/2006/main">
+  <p:cSld>
+    <p:spTree>
+      <p:nvGrpSpPr>
+        <p:cNvPr id="1" name=""/>
+        <p:cNvGrpSpPr/>
+        <p:nvPr/>
+      </p:nvGrpSpPr>
+      <p:grpSpPr>
+        <a:xfrm>
+          <a:off x="0" y="0"/>
+          <a:ext cx="0" cy="0"/>
+          <a:chOff x="0" y="0"/>
+          <a:chExt cx="0" cy="0"/>
+        </a:xfrm>
+      </p:grpSpPr>
+      <p:sp>
+        <p:nvSpPr>
+          <p:cNvPr id="2" name="Title 1">
+            <a:extLst>
+              <a:ext uri="{FF2B5EF4-FFF2-40B4-BE49-F238E27FC236}">
+                <a16:creationId xmlns:a16="http://schemas.microsoft.com/office/drawing/2014/main" id="{AA1BC565-1213-8955-1543-CB812CF1107F}"/>
+              </a:ext>
+            </a:extLst>
+          </p:cNvPr>
+          <p:cNvSpPr>
+            <a:spLocks noGrp="1"/>
+          </p:cNvSpPr>
+          <p:nvPr>
+            <p:ph type="title"/>
+          </p:nvPr>
+        </p:nvSpPr>
+        <p:spPr/>
+        <p:txBody>
+          <a:bodyPr/>
+          <a:lstStyle/>
+          <a:p>
+            <a:r>
+              <a:rPr lang="en-US" dirty="0"/>
+              <a:t>Tournament tree</a:t>
+            </a:r>
+          </a:p>
+        </p:txBody>
+      </p:sp>
+      <p:sp>
+        <p:nvSpPr>
+          <p:cNvPr id="3" name="Content Placeholder 2">
+            <a:extLst>
+              <a:ext uri="{FF2B5EF4-FFF2-40B4-BE49-F238E27FC236}">
+                <a16:creationId xmlns:a16="http://schemas.microsoft.com/office/drawing/2014/main" id="{BFE2F52D-094C-F467-6F22-E72B55C66D4B}"/>
+              </a:ext>
+            </a:extLst>
+          </p:cNvPr>
+          <p:cNvSpPr>
+            <a:spLocks noGrp="1"/>
+          </p:cNvSpPr>
+          <p:nvPr>
+            <p:ph idx="1"/>
+          </p:nvPr>
+        </p:nvSpPr>
+        <p:spPr/>
+        <p:txBody>
+          <a:bodyPr/>
+          <a:lstStyle/>
+          <a:p>
+            <a:pPr marL="0" indent="0">
+              <a:buNone/>
+            </a:pPr>
+            <a:r>
+              <a:rPr lang="en-US" dirty="0"/>
+              <a:t>Basically a modified merge sort</a:t>
+            </a:r>
+          </a:p>
+        </p:txBody>
+      </p:sp>
+      <p:pic>
+        <p:nvPicPr>
+          <p:cNvPr id="1026" name="Picture 2">
+            <a:extLst>
+              <a:ext uri="{FF2B5EF4-FFF2-40B4-BE49-F238E27FC236}">
+                <a16:creationId xmlns:a16="http://schemas.microsoft.com/office/drawing/2014/main" id="{EDEDFBC2-4FB5-39A5-4132-7EEDE46A65C8}"/>
+              </a:ext>
+            </a:extLst>
+          </p:cNvPr>
+          <p:cNvPicPr>
+            <a:picLocks noChangeAspect="1" noChangeArrowheads="1"/>
+          </p:cNvPicPr>
+          <p:nvPr/>
+        </p:nvPicPr>
+        <p:blipFill>
+          <a:blip r:embed="rId2">
+            <a:extLst>
+              <a:ext uri="{28A0092B-C50C-407E-A947-70E740481C1C}">
+                <a14:useLocalDpi xmlns:a14="http://schemas.microsoft.com/office/drawing/2010/main" val="0"/>
+              </a:ext>
+            </a:extLst>
+          </a:blip>
+          <a:srcRect/>
+          <a:stretch>
+            <a:fillRect/>
+          </a:stretch>
+        </p:blipFill>
+        <p:spPr bwMode="auto">
+          <a:xfrm>
+            <a:off x="4603955" y="2432844"/>
+            <a:ext cx="2654300" cy="3136900"/>
+          </a:xfrm>
+          <a:prstGeom prst="rect">
+            <a:avLst/>
+          </a:prstGeom>
+          <a:noFill/>
+          <a:extLst>
+            <a:ext uri="{909E8E84-426E-40DD-AFC4-6F175D3DCCD1}">
+              <a14:hiddenFill xmlns:a14="http://schemas.microsoft.com/office/drawing/2010/main">
+                <a:solidFill>
+                  <a:srgbClr val="FFFFFF"/>
+                </a:solidFill>
+              </a14:hiddenFill>
+            </a:ext>
+          </a:extLst>
+        </p:spPr>
+      </p:pic>
+    </p:spTree>
+    <p:extLst>
+      <p:ext uri="{BB962C8B-B14F-4D97-AF65-F5344CB8AC3E}">
+        <p14:creationId xmlns:p14="http://schemas.microsoft.com/office/powerpoint/2010/main" val="3555680574"/>
+      </p:ext>
+    </p:extLst>
+  </p:cSld>
+  <p:clrMapOvr>
+    <a:masterClrMapping/>
+  </p:clrMapOvr>
+</p:sld>
+</file>
+
+<file path=ppt/slides/slide15.xml><?xml version="1.0" encoding="utf-8"?>
+<p:sld xmlns:a="http://schemas.openxmlformats.org/drawingml/2006/main" xmlns:r="http://schemas.openxmlformats.org/officeDocument/2006/relationships" xmlns:p="http://schemas.openxmlformats.org/presentationml/2006/main">
+  <p:cSld>
+    <p:spTree>
+      <p:nvGrpSpPr>
+        <p:cNvPr id="1" name=""/>
+        <p:cNvGrpSpPr/>
+        <p:nvPr/>
+      </p:nvGrpSpPr>
+      <p:grpSpPr>
+        <a:xfrm>
+          <a:off x="0" y="0"/>
+          <a:ext cx="0" cy="0"/>
+          <a:chOff x="0" y="0"/>
+          <a:chExt cx="0" cy="0"/>
+        </a:xfrm>
+      </p:grpSpPr>
+      <p:sp>
+        <p:nvSpPr>
+          <p:cNvPr id="2" name="Title 1">
+            <a:extLst>
+              <a:ext uri="{FF2B5EF4-FFF2-40B4-BE49-F238E27FC236}">
+                <a16:creationId xmlns:a16="http://schemas.microsoft.com/office/drawing/2014/main" id="{AA1BC565-1213-8955-1543-CB812CF1107F}"/>
+              </a:ext>
+            </a:extLst>
+          </p:cNvPr>
+          <p:cNvSpPr>
+            <a:spLocks noGrp="1"/>
+          </p:cNvSpPr>
+          <p:nvPr>
+            <p:ph type="title"/>
+          </p:nvPr>
+        </p:nvSpPr>
+        <p:spPr>
+          <a:xfrm>
+            <a:off x="129862" y="60116"/>
+            <a:ext cx="10515600" cy="1325563"/>
+          </a:xfrm>
+        </p:spPr>
+        <p:txBody>
+          <a:bodyPr/>
+          <a:lstStyle/>
+          <a:p>
+            <a:r>
+              <a:rPr lang="en-US" dirty="0"/>
+              <a:t>Tournament tree</a:t>
+            </a:r>
+          </a:p>
+        </p:txBody>
+      </p:sp>
+      <p:sp>
+        <p:nvSpPr>
+          <p:cNvPr id="3" name="Content Placeholder 2">
+            <a:extLst>
+              <a:ext uri="{FF2B5EF4-FFF2-40B4-BE49-F238E27FC236}">
+                <a16:creationId xmlns:a16="http://schemas.microsoft.com/office/drawing/2014/main" id="{BFE2F52D-094C-F467-6F22-E72B55C66D4B}"/>
+              </a:ext>
+            </a:extLst>
+          </p:cNvPr>
+          <p:cNvSpPr>
+            <a:spLocks noGrp="1"/>
+          </p:cNvSpPr>
+          <p:nvPr>
+            <p:ph idx="1"/>
+          </p:nvPr>
+        </p:nvSpPr>
+        <p:spPr>
+          <a:xfrm>
+            <a:off x="129862" y="1581491"/>
+            <a:ext cx="4068651" cy="4351338"/>
+          </a:xfrm>
+        </p:spPr>
+        <p:txBody>
+          <a:bodyPr/>
+          <a:lstStyle/>
+          <a:p>
+            <a:pPr marL="0" indent="0">
+              <a:buNone/>
+            </a:pPr>
+            <a:r>
+              <a:rPr lang="en-US" dirty="0"/>
+              <a:t>Implemented in </a:t>
+            </a:r>
+            <a:r>
+              <a:rPr lang="en-US" dirty="0" err="1"/>
+              <a:t>RecordFileManipulator</a:t>
+            </a:r>
+            <a:endParaRPr lang="en-US" dirty="0"/>
+          </a:p>
+        </p:txBody>
+      </p:sp>
+      <p:pic>
+        <p:nvPicPr>
+          <p:cNvPr id="4" name="Picture 3">
+            <a:extLst>
+              <a:ext uri="{FF2B5EF4-FFF2-40B4-BE49-F238E27FC236}">
+                <a16:creationId xmlns:a16="http://schemas.microsoft.com/office/drawing/2014/main" id="{A5509B8E-2F31-4209-4453-D8986CCCD494}"/>
+              </a:ext>
+            </a:extLst>
+          </p:cNvPr>
+          <p:cNvPicPr>
+            <a:picLocks noChangeAspect="1"/>
+          </p:cNvPicPr>
+          <p:nvPr/>
+        </p:nvPicPr>
+        <p:blipFill>
+          <a:blip r:embed="rId2"/>
+          <a:stretch>
+            <a:fillRect/>
+          </a:stretch>
+        </p:blipFill>
+        <p:spPr>
+          <a:xfrm>
+            <a:off x="4289738" y="3297920"/>
+            <a:ext cx="7772400" cy="3499964"/>
+          </a:xfrm>
+          <a:prstGeom prst="rect">
+            <a:avLst/>
+          </a:prstGeom>
+        </p:spPr>
+      </p:pic>
+      <p:pic>
+        <p:nvPicPr>
+          <p:cNvPr id="5" name="Picture 4">
+            <a:extLst>
+              <a:ext uri="{FF2B5EF4-FFF2-40B4-BE49-F238E27FC236}">
+                <a16:creationId xmlns:a16="http://schemas.microsoft.com/office/drawing/2014/main" id="{60415BC1-BA24-97D2-ACE7-6304BD3DF4D4}"/>
+              </a:ext>
+            </a:extLst>
+          </p:cNvPr>
+          <p:cNvPicPr>
+            <a:picLocks noChangeAspect="1"/>
+          </p:cNvPicPr>
+          <p:nvPr/>
+        </p:nvPicPr>
+        <p:blipFill>
+          <a:blip r:embed="rId3"/>
+          <a:stretch>
+            <a:fillRect/>
+          </a:stretch>
+        </p:blipFill>
+        <p:spPr>
+          <a:xfrm>
+            <a:off x="4289738" y="0"/>
+            <a:ext cx="7772400" cy="3162983"/>
+          </a:xfrm>
+          <a:prstGeom prst="rect">
+            <a:avLst/>
+          </a:prstGeom>
+        </p:spPr>
+      </p:pic>
+    </p:spTree>
+    <p:extLst>
+      <p:ext uri="{BB962C8B-B14F-4D97-AF65-F5344CB8AC3E}">
+        <p14:creationId xmlns:p14="http://schemas.microsoft.com/office/powerpoint/2010/main" val="3176997546"/>
+      </p:ext>
+    </p:extLst>
+  </p:cSld>
+  <p:clrMapOvr>
+    <a:masterClrMapping/>
+  </p:clrMapOvr>
+</p:sld>
+</file>
+
+<file path=ppt/slides/slide16.xml><?xml version="1.0" encoding="utf-8"?>
+<p:sld xmlns:a="http://schemas.openxmlformats.org/drawingml/2006/main" xmlns:r="http://schemas.openxmlformats.org/officeDocument/2006/relationships" xmlns:p="http://schemas.openxmlformats.org/presentationml/2006/main">
+  <p:cSld>
+    <p:spTree>
+      <p:nvGrpSpPr>
+        <p:cNvPr id="1" name=""/>
+        <p:cNvGrpSpPr/>
+        <p:nvPr/>
+      </p:nvGrpSpPr>
+      <p:grpSpPr>
+        <a:xfrm>
+          <a:off x="0" y="0"/>
+          <a:ext cx="0" cy="0"/>
+          <a:chOff x="0" y="0"/>
+          <a:chExt cx="0" cy="0"/>
+        </a:xfrm>
+      </p:grpSpPr>
+      <p:sp>
+        <p:nvSpPr>
+          <p:cNvPr id="2" name="제목 1">
+            <a:extLst>
+              <a:ext uri="{FF2B5EF4-FFF2-40B4-BE49-F238E27FC236}">
+                <a16:creationId xmlns:a16="http://schemas.microsoft.com/office/drawing/2014/main" id="{A9C9D23E-5AF7-9FB7-EA2F-0BED102EEC0C}"/>
+              </a:ext>
+            </a:extLst>
+          </p:cNvPr>
+          <p:cNvSpPr>
+            <a:spLocks noGrp="1"/>
+          </p:cNvSpPr>
+          <p:nvPr>
+            <p:ph type="title"/>
+          </p:nvPr>
+        </p:nvSpPr>
+        <p:spPr/>
+        <p:txBody>
+          <a:bodyPr/>
+          <a:lstStyle/>
+          <a:p>
+            <a:r>
+              <a:rPr kumimoji="1" lang="en-US" altLang="ko-Kore-DK" dirty="0"/>
+              <a:t>Design Remarks</a:t>
+            </a:r>
+            <a:endParaRPr kumimoji="1" lang="ko-Kore-DK" altLang="en-US" dirty="0"/>
+          </a:p>
+        </p:txBody>
+      </p:sp>
+      <p:sp>
+        <p:nvSpPr>
+          <p:cNvPr id="3" name="내용 개체 틀 2">
+            <a:extLst>
+              <a:ext uri="{FF2B5EF4-FFF2-40B4-BE49-F238E27FC236}">
+                <a16:creationId xmlns:a16="http://schemas.microsoft.com/office/drawing/2014/main" id="{6589F9DD-10C4-D57D-0DF9-AC174B71245E}"/>
+              </a:ext>
+            </a:extLst>
+          </p:cNvPr>
+          <p:cNvSpPr>
+            <a:spLocks noGrp="1"/>
+          </p:cNvSpPr>
+          <p:nvPr>
+            <p:ph idx="1"/>
+          </p:nvPr>
+        </p:nvSpPr>
+        <p:spPr/>
+        <p:txBody>
+          <a:bodyPr/>
+          <a:lstStyle/>
+          <a:p>
+            <a:r>
+              <a:rPr kumimoji="1" lang="en-US" altLang="ko-Kore-DK" dirty="0"/>
+              <a:t>Control states as future &amp; promise to schedule the overall flow</a:t>
+            </a:r>
+          </a:p>
+          <a:p>
+            <a:r>
+              <a:rPr kumimoji="1" lang="en-US" altLang="ko-Kore-DK" dirty="0" err="1"/>
+              <a:t>Sort&amp;Sample</a:t>
+            </a:r>
+            <a:r>
+              <a:rPr kumimoji="1" lang="en-US" altLang="ko-Kore-DK" dirty="0"/>
+              <a:t> before register to the master</a:t>
+            </a:r>
+          </a:p>
+          <a:p>
+            <a:r>
+              <a:rPr kumimoji="1" lang="en-US" altLang="ko-Kore-DK" dirty="0"/>
+              <a:t>Separate </a:t>
+            </a:r>
+            <a:r>
+              <a:rPr kumimoji="1" lang="en-US" altLang="ko-Kore-DK" dirty="0" err="1"/>
+              <a:t>DistributeStart</a:t>
+            </a:r>
+            <a:r>
+              <a:rPr kumimoji="1" lang="en-US" altLang="ko-Kore-DK" dirty="0"/>
+              <a:t>/</a:t>
+            </a:r>
+            <a:r>
+              <a:rPr kumimoji="1" lang="en-US" altLang="ko-Kore-DK" dirty="0" err="1"/>
+              <a:t>DistributeFinish</a:t>
+            </a:r>
+            <a:r>
+              <a:rPr kumimoji="1" lang="en-US" altLang="ko-Kore-DK" dirty="0"/>
+              <a:t> &amp; </a:t>
+            </a:r>
+            <a:r>
+              <a:rPr kumimoji="1" lang="en-US" altLang="ko-Kore-DK" dirty="0" err="1"/>
+              <a:t>SortStart</a:t>
+            </a:r>
+            <a:r>
+              <a:rPr kumimoji="1" lang="en-US" altLang="ko-Kore-DK" dirty="0"/>
+              <a:t>/</a:t>
+            </a:r>
+            <a:r>
+              <a:rPr kumimoji="1" lang="en-US" altLang="ko-Kore-DK" dirty="0" err="1"/>
+              <a:t>SortFinish</a:t>
+            </a:r>
+            <a:r>
+              <a:rPr kumimoji="1" lang="en-US" altLang="ko-Kore-DK" dirty="0"/>
+              <a:t> requests so that the distribution and sorting(merging) does not happen in the </a:t>
+            </a:r>
+            <a:r>
+              <a:rPr kumimoji="1" lang="en-US" altLang="ko-Kore-DK" dirty="0" err="1"/>
+              <a:t>httpclient’s</a:t>
+            </a:r>
+            <a:r>
+              <a:rPr kumimoji="1" lang="en-US" altLang="ko-Kore-DK" dirty="0"/>
+              <a:t> request-response context</a:t>
+            </a:r>
+          </a:p>
+          <a:p>
+            <a:r>
+              <a:rPr kumimoji="1" lang="en-US" altLang="ko-Kore-DK" dirty="0"/>
+              <a:t>Decided the size of </a:t>
+            </a:r>
+            <a:r>
+              <a:rPr kumimoji="1" lang="en-US" altLang="ko-Kore-DK" dirty="0" err="1"/>
+              <a:t>temp&amp;output</a:t>
+            </a:r>
+            <a:r>
+              <a:rPr kumimoji="1" lang="en-US" altLang="ko-Kore-DK" dirty="0"/>
+              <a:t> files as 2MB, because of OOM error during file save</a:t>
+            </a:r>
+            <a:endParaRPr kumimoji="1" lang="ko-Kore-DK" altLang="en-US" dirty="0"/>
+          </a:p>
+        </p:txBody>
+      </p:sp>
+    </p:spTree>
+    <p:extLst>
+      <p:ext uri="{BB962C8B-B14F-4D97-AF65-F5344CB8AC3E}">
+        <p14:creationId xmlns:p14="http://schemas.microsoft.com/office/powerpoint/2010/main" val="3485952277"/>
+      </p:ext>
+    </p:extLst>
+  </p:cSld>
+  <p:clrMapOvr>
+    <a:masterClrMapping/>
+  </p:clrMapOvr>
+</p:sld>
+</file>
+
+<file path=ppt/slides/slide17.xml><?xml version="1.0" encoding="utf-8"?>
+<p:sld xmlns:a="http://schemas.openxmlformats.org/drawingml/2006/main" xmlns:r="http://schemas.openxmlformats.org/officeDocument/2006/relationships" xmlns:p="http://schemas.openxmlformats.org/presentationml/2006/main">
+  <p:cSld>
+    <p:spTree>
+      <p:nvGrpSpPr>
+        <p:cNvPr id="1" name=""/>
+        <p:cNvGrpSpPr/>
+        <p:nvPr/>
+      </p:nvGrpSpPr>
+      <p:grpSpPr>
+        <a:xfrm>
+          <a:off x="0" y="0"/>
+          <a:ext cx="0" cy="0"/>
+          <a:chOff x="0" y="0"/>
+          <a:chExt cx="0" cy="0"/>
+        </a:xfrm>
+      </p:grpSpPr>
       <p:sp>
         <p:nvSpPr>
           <p:cNvPr id="2" name="제목 1">
@@ -3647,9 +4993,16 @@
             <p:ph idx="1"/>
           </p:nvPr>
         </p:nvSpPr>
-        <p:spPr/>
-        <p:txBody>
-          <a:bodyPr/>
+        <p:spPr>
+          <a:xfrm>
+            <a:off x="838200" y="1825625"/>
+            <a:ext cx="10515600" cy="4771820"/>
+          </a:xfrm>
+        </p:spPr>
+        <p:txBody>
+          <a:bodyPr>
+            <a:normAutofit lnSpcReduction="10000"/>
+          </a:bodyPr>
           <a:lstStyle/>
           <a:p>
             <a:r>
@@ -3689,6 +5042,47 @@
             <a:r>
               <a:rPr kumimoji="1" lang="en-US" altLang="ko-Kore-DK" dirty="0"/>
               <a:t>Set detailed milestone &amp; due date</a:t>
+            </a:r>
+          </a:p>
+          <a:p>
+            <a:endParaRPr kumimoji="1" lang="en-US" altLang="ko-Kore-DK" dirty="0"/>
+          </a:p>
+          <a:p>
+            <a:r>
+              <a:rPr kumimoji="1" lang="en-US" altLang="ko-Kore-DK" dirty="0" err="1"/>
+              <a:t>Jeongho</a:t>
+            </a:r>
+            <a:r>
+              <a:rPr kumimoji="1" lang="en-US" altLang="ko-Kore-DK" dirty="0"/>
+              <a:t>:</a:t>
+            </a:r>
+          </a:p>
+          <a:p>
+            <a:r>
+              <a:rPr kumimoji="1" lang="en-US" altLang="ko-Kore-DK" dirty="0"/>
+              <a:t>Think more about time complexity(e.g., list </a:t>
+            </a:r>
+            <a:r>
+              <a:rPr kumimoji="1" lang="en-US" altLang="ko-Kore-DK" dirty="0" err="1"/>
+              <a:t>concat</a:t>
+            </a:r>
+            <a:r>
+              <a:rPr kumimoji="1" lang="en-US" altLang="ko-Kore-DK" dirty="0"/>
+              <a:t> vs </a:t>
+            </a:r>
+            <a:r>
+              <a:rPr kumimoji="1" lang="en-US" altLang="ko-Kore-DK" dirty="0" err="1"/>
+              <a:t>flatmap</a:t>
+            </a:r>
+            <a:r>
+              <a:rPr kumimoji="1" lang="en-US" altLang="ko-Kore-DK" dirty="0"/>
+              <a:t>?, list or cats chain?)</a:t>
+            </a:r>
+          </a:p>
+          <a:p>
+            <a:r>
+              <a:rPr kumimoji="1" lang="en-US" altLang="ko-Kore-DK" dirty="0"/>
+              <a:t>Automate testing, formatting</a:t>
             </a:r>
           </a:p>
           <a:p>
@@ -4827,7 +6221,7 @@
           <p:cNvPr id="2" name="Title 1">
             <a:extLst>
               <a:ext uri="{FF2B5EF4-FFF2-40B4-BE49-F238E27FC236}">
-                <a16:creationId xmlns:a16="http://schemas.microsoft.com/office/drawing/2014/main" id="{AE9E209F-E715-7E31-5C4C-64EE31BC4F1A}"/>
+                <a16:creationId xmlns:a16="http://schemas.microsoft.com/office/drawing/2014/main" id="{818770BC-D4BD-C2FF-FDDF-70E95AD1DF1B}"/>
               </a:ext>
             </a:extLst>
           </p:cNvPr>
@@ -4845,119 +6239,94 @@
           <a:p>
             <a:r>
               <a:rPr lang="en-US" dirty="0"/>
-              <a:t>Master</a:t>
-            </a:r>
-          </a:p>
-        </p:txBody>
-      </p:sp>
-      <p:pic>
-        <p:nvPicPr>
-          <p:cNvPr id="5" name="Content Placeholder 4" descr="A diagram of a work flow&#10;&#10;Description automatically generated">
-            <a:extLst>
-              <a:ext uri="{FF2B5EF4-FFF2-40B4-BE49-F238E27FC236}">
-                <a16:creationId xmlns:a16="http://schemas.microsoft.com/office/drawing/2014/main" id="{2B41067C-84C6-0DFB-F1F9-CC54D99715E7}"/>
-              </a:ext>
-            </a:extLst>
-          </p:cNvPr>
-          <p:cNvPicPr>
-            <a:picLocks noGrp="1" noChangeAspect="1"/>
-          </p:cNvPicPr>
+              <a:t>Design</a:t>
+            </a:r>
+          </a:p>
+        </p:txBody>
+      </p:sp>
+      <p:sp>
+        <p:nvSpPr>
+          <p:cNvPr id="3" name="Content Placeholder 2">
+            <a:extLst>
+              <a:ext uri="{FF2B5EF4-FFF2-40B4-BE49-F238E27FC236}">
+                <a16:creationId xmlns:a16="http://schemas.microsoft.com/office/drawing/2014/main" id="{261B058E-A2CD-7033-C14C-4D31FC039FAA}"/>
+              </a:ext>
+            </a:extLst>
+          </p:cNvPr>
+          <p:cNvSpPr>
+            <a:spLocks noGrp="1"/>
+          </p:cNvSpPr>
           <p:nvPr>
             <p:ph idx="1"/>
           </p:nvPr>
-        </p:nvPicPr>
-        <p:blipFill>
-          <a:blip r:embed="rId2"/>
-          <a:stretch>
-            <a:fillRect/>
-          </a:stretch>
-        </p:blipFill>
-        <p:spPr>
-          <a:xfrm>
-            <a:off x="838200" y="1436912"/>
-            <a:ext cx="6922964" cy="5221417"/>
-          </a:xfrm>
-        </p:spPr>
-      </p:pic>
-      <p:sp>
-        <p:nvSpPr>
-          <p:cNvPr id="6" name="TextBox 5">
-            <a:extLst>
-              <a:ext uri="{FF2B5EF4-FFF2-40B4-BE49-F238E27FC236}">
-                <a16:creationId xmlns:a16="http://schemas.microsoft.com/office/drawing/2014/main" id="{D718BF41-F549-D26B-5422-F0E221C7FB88}"/>
-              </a:ext>
-            </a:extLst>
-          </p:cNvPr>
-          <p:cNvSpPr txBox="1"/>
-          <p:nvPr/>
-        </p:nvSpPr>
-        <p:spPr>
-          <a:xfrm>
-            <a:off x="7867859" y="1874728"/>
-            <a:ext cx="4170066" cy="3539430"/>
-          </a:xfrm>
-          <a:prstGeom prst="rect">
-            <a:avLst/>
-          </a:prstGeom>
-          <a:noFill/>
-        </p:spPr>
-        <p:txBody>
-          <a:bodyPr wrap="square" rtlCol="0">
-            <a:spAutoFit/>
-          </a:bodyPr>
-          <a:lstStyle/>
-          <a:p>
-            <a:r>
-              <a:rPr lang="en-US" sz="2800" dirty="0"/>
-              <a:t>Pink: </a:t>
-            </a:r>
-            <a:r>
-              <a:rPr lang="en-US" sz="2800" dirty="0" err="1"/>
-              <a:t>gRPC</a:t>
-            </a:r>
-            <a:r>
-              <a:rPr lang="en-US" sz="2800" dirty="0"/>
-              <a:t> Service</a:t>
-            </a:r>
-          </a:p>
-          <a:p>
-            <a:endParaRPr lang="en-US" sz="2800" dirty="0"/>
-          </a:p>
-          <a:p>
-            <a:r>
-              <a:rPr lang="en-US" sz="2800" dirty="0"/>
-              <a:t>Black: Promise(or Future)</a:t>
-            </a:r>
-          </a:p>
-          <a:p>
-            <a:endParaRPr lang="en-US" sz="2800" dirty="0"/>
-          </a:p>
-          <a:p>
-            <a:r>
-              <a:rPr lang="en-US" sz="2800" dirty="0"/>
-              <a:t>Purple: function returning Future[Unit]</a:t>
-            </a:r>
-          </a:p>
-          <a:p>
-            <a:endParaRPr lang="en-US" sz="2800" dirty="0"/>
-          </a:p>
-          <a:p>
-            <a:r>
-              <a:rPr lang="en-US" sz="2800" dirty="0"/>
-              <a:t>Blue: Result of </a:t>
-            </a:r>
-            <a:r>
-              <a:rPr lang="en-US" sz="2800" dirty="0" err="1"/>
-              <a:t>Await.Result</a:t>
-            </a:r>
-            <a:endParaRPr lang="en-US" sz="2800" dirty="0"/>
+        </p:nvSpPr>
+        <p:spPr/>
+        <p:txBody>
+          <a:bodyPr/>
+          <a:lstStyle/>
+          <a:p>
+            <a:pPr marL="0" indent="0">
+              <a:buNone/>
+            </a:pPr>
+            <a:r>
+              <a:rPr lang="en-US" dirty="0"/>
+              <a:t>No polling(no while() {sleep})</a:t>
+            </a:r>
+          </a:p>
+          <a:p>
+            <a:pPr marL="0" indent="0">
+              <a:buNone/>
+            </a:pPr>
+            <a:endParaRPr lang="en-US" dirty="0"/>
+          </a:p>
+          <a:p>
+            <a:pPr marL="0" indent="0">
+              <a:buNone/>
+            </a:pPr>
+            <a:r>
+              <a:rPr lang="en-US" dirty="0"/>
+              <a:t>Only Future, Promise</a:t>
+            </a:r>
+          </a:p>
+          <a:p>
+            <a:pPr marL="0" indent="0">
+              <a:buNone/>
+            </a:pPr>
+            <a:endParaRPr lang="en-US" dirty="0"/>
+          </a:p>
+          <a:p>
+            <a:pPr marL="0" indent="0">
+              <a:buNone/>
+            </a:pPr>
+            <a:r>
+              <a:rPr lang="en-US" dirty="0"/>
+              <a:t>Terminology</a:t>
+            </a:r>
+          </a:p>
+          <a:p>
+            <a:pPr marL="0" indent="0">
+              <a:buNone/>
+            </a:pPr>
+            <a:r>
+              <a:rPr lang="en-US" dirty="0"/>
+              <a:t>Distribute = shuffle</a:t>
+            </a:r>
+          </a:p>
+          <a:p>
+            <a:pPr marL="0" indent="0">
+              <a:buNone/>
+            </a:pPr>
+            <a:r>
+              <a:rPr lang="en-US" dirty="0"/>
+              <a:t>Sort = merge</a:t>
+            </a:r>
           </a:p>
         </p:txBody>
       </p:sp>
     </p:spTree>
     <p:extLst>
       <p:ext uri="{BB962C8B-B14F-4D97-AF65-F5344CB8AC3E}">
-        <p14:creationId xmlns:p14="http://schemas.microsoft.com/office/powerpoint/2010/main" val="28192646"/>
+        <p14:creationId xmlns:p14="http://schemas.microsoft.com/office/powerpoint/2010/main" val="755411900"/>
       </p:ext>
     </p:extLst>
   </p:cSld>
@@ -5007,11 +6376,40 @@
           <a:p>
             <a:r>
               <a:rPr lang="en-US" dirty="0"/>
-              <a:t>Worker</a:t>
-            </a:r>
-          </a:p>
-        </p:txBody>
-      </p:sp>
+              <a:t>Master</a:t>
+            </a:r>
+          </a:p>
+        </p:txBody>
+      </p:sp>
+      <p:pic>
+        <p:nvPicPr>
+          <p:cNvPr id="5" name="Content Placeholder 4" descr="A diagram of a work flow&#10;&#10;Description automatically generated">
+            <a:extLst>
+              <a:ext uri="{FF2B5EF4-FFF2-40B4-BE49-F238E27FC236}">
+                <a16:creationId xmlns:a16="http://schemas.microsoft.com/office/drawing/2014/main" id="{2B41067C-84C6-0DFB-F1F9-CC54D99715E7}"/>
+              </a:ext>
+            </a:extLst>
+          </p:cNvPr>
+          <p:cNvPicPr>
+            <a:picLocks noGrp="1" noChangeAspect="1"/>
+          </p:cNvPicPr>
+          <p:nvPr>
+            <p:ph idx="1"/>
+          </p:nvPr>
+        </p:nvPicPr>
+        <p:blipFill>
+          <a:blip r:embed="rId2"/>
+          <a:stretch>
+            <a:fillRect/>
+          </a:stretch>
+        </p:blipFill>
+        <p:spPr>
+          <a:xfrm>
+            <a:off x="838200" y="1436912"/>
+            <a:ext cx="6922964" cy="5221417"/>
+          </a:xfrm>
+        </p:spPr>
+      </p:pic>
       <p:sp>
         <p:nvSpPr>
           <p:cNvPr id="6" name="TextBox 5">
@@ -5087,39 +6485,10 @@
           </a:p>
         </p:txBody>
       </p:sp>
-      <p:pic>
-        <p:nvPicPr>
-          <p:cNvPr id="8" name="Content Placeholder 7" descr="A diagram of a process&#10;&#10;Description automatically generated">
-            <a:extLst>
-              <a:ext uri="{FF2B5EF4-FFF2-40B4-BE49-F238E27FC236}">
-                <a16:creationId xmlns:a16="http://schemas.microsoft.com/office/drawing/2014/main" id="{BA3971E5-9CEC-D0D6-1C16-578DF1D100CF}"/>
-              </a:ext>
-            </a:extLst>
-          </p:cNvPr>
-          <p:cNvPicPr>
-            <a:picLocks noGrp="1" noChangeAspect="1"/>
-          </p:cNvPicPr>
-          <p:nvPr>
-            <p:ph idx="1"/>
-          </p:nvPr>
-        </p:nvPicPr>
-        <p:blipFill>
-          <a:blip r:embed="rId2"/>
-          <a:stretch>
-            <a:fillRect/>
-          </a:stretch>
-        </p:blipFill>
-        <p:spPr>
-          <a:xfrm>
-            <a:off x="154075" y="1765640"/>
-            <a:ext cx="7713784" cy="3757606"/>
-          </a:xfrm>
-        </p:spPr>
-      </p:pic>
     </p:spTree>
     <p:extLst>
       <p:ext uri="{BB962C8B-B14F-4D97-AF65-F5344CB8AC3E}">
-        <p14:creationId xmlns:p14="http://schemas.microsoft.com/office/powerpoint/2010/main" val="1280205688"/>
+        <p14:creationId xmlns:p14="http://schemas.microsoft.com/office/powerpoint/2010/main" val="28192646"/>
       </p:ext>
     </p:extLst>
   </p:cSld>

</xml_diff>

<commit_message>
docs: export final presentation as pdf
</commit_message>
<xml_diff>
--- a/docs/Final Presentation.pptx
+++ b/docs/Final Presentation.pptx
@@ -277,7 +277,7 @@
           <a:p>
             <a:fld id="{B6CC3BC1-992D-1F43-98B1-8B8E610D7F7F}" type="datetimeFigureOut">
               <a:rPr kumimoji="1" lang="ko-Kore-DK" altLang="en-US" smtClean="0"/>
-              <a:t>12/14/23</a:t>
+              <a:t>11/15/24</a:t>
             </a:fld>
             <a:endParaRPr kumimoji="1" lang="ko-Kore-DK" altLang="en-US"/>
           </a:p>
@@ -477,7 +477,7 @@
           <a:p>
             <a:fld id="{B6CC3BC1-992D-1F43-98B1-8B8E610D7F7F}" type="datetimeFigureOut">
               <a:rPr kumimoji="1" lang="ko-Kore-DK" altLang="en-US" smtClean="0"/>
-              <a:t>12/14/23</a:t>
+              <a:t>11/15/24</a:t>
             </a:fld>
             <a:endParaRPr kumimoji="1" lang="ko-Kore-DK" altLang="en-US"/>
           </a:p>
@@ -687,7 +687,7 @@
           <a:p>
             <a:fld id="{B6CC3BC1-992D-1F43-98B1-8B8E610D7F7F}" type="datetimeFigureOut">
               <a:rPr kumimoji="1" lang="ko-Kore-DK" altLang="en-US" smtClean="0"/>
-              <a:t>12/14/23</a:t>
+              <a:t>11/15/24</a:t>
             </a:fld>
             <a:endParaRPr kumimoji="1" lang="ko-Kore-DK" altLang="en-US"/>
           </a:p>
@@ -887,7 +887,7 @@
           <a:p>
             <a:fld id="{B6CC3BC1-992D-1F43-98B1-8B8E610D7F7F}" type="datetimeFigureOut">
               <a:rPr kumimoji="1" lang="ko-Kore-DK" altLang="en-US" smtClean="0"/>
-              <a:t>12/14/23</a:t>
+              <a:t>11/15/24</a:t>
             </a:fld>
             <a:endParaRPr kumimoji="1" lang="ko-Kore-DK" altLang="en-US"/>
           </a:p>
@@ -1163,7 +1163,7 @@
           <a:p>
             <a:fld id="{B6CC3BC1-992D-1F43-98B1-8B8E610D7F7F}" type="datetimeFigureOut">
               <a:rPr kumimoji="1" lang="ko-Kore-DK" altLang="en-US" smtClean="0"/>
-              <a:t>12/14/23</a:t>
+              <a:t>11/15/24</a:t>
             </a:fld>
             <a:endParaRPr kumimoji="1" lang="ko-Kore-DK" altLang="en-US"/>
           </a:p>
@@ -1431,7 +1431,7 @@
           <a:p>
             <a:fld id="{B6CC3BC1-992D-1F43-98B1-8B8E610D7F7F}" type="datetimeFigureOut">
               <a:rPr kumimoji="1" lang="ko-Kore-DK" altLang="en-US" smtClean="0"/>
-              <a:t>12/14/23</a:t>
+              <a:t>11/15/24</a:t>
             </a:fld>
             <a:endParaRPr kumimoji="1" lang="ko-Kore-DK" altLang="en-US"/>
           </a:p>
@@ -1846,7 +1846,7 @@
           <a:p>
             <a:fld id="{B6CC3BC1-992D-1F43-98B1-8B8E610D7F7F}" type="datetimeFigureOut">
               <a:rPr kumimoji="1" lang="ko-Kore-DK" altLang="en-US" smtClean="0"/>
-              <a:t>12/14/23</a:t>
+              <a:t>11/15/24</a:t>
             </a:fld>
             <a:endParaRPr kumimoji="1" lang="ko-Kore-DK" altLang="en-US"/>
           </a:p>
@@ -1988,7 +1988,7 @@
           <a:p>
             <a:fld id="{B6CC3BC1-992D-1F43-98B1-8B8E610D7F7F}" type="datetimeFigureOut">
               <a:rPr kumimoji="1" lang="ko-Kore-DK" altLang="en-US" smtClean="0"/>
-              <a:t>12/14/23</a:t>
+              <a:t>11/15/24</a:t>
             </a:fld>
             <a:endParaRPr kumimoji="1" lang="ko-Kore-DK" altLang="en-US"/>
           </a:p>
@@ -2101,7 +2101,7 @@
           <a:p>
             <a:fld id="{B6CC3BC1-992D-1F43-98B1-8B8E610D7F7F}" type="datetimeFigureOut">
               <a:rPr kumimoji="1" lang="ko-Kore-DK" altLang="en-US" smtClean="0"/>
-              <a:t>12/14/23</a:t>
+              <a:t>11/15/24</a:t>
             </a:fld>
             <a:endParaRPr kumimoji="1" lang="ko-Kore-DK" altLang="en-US"/>
           </a:p>
@@ -2414,7 +2414,7 @@
           <a:p>
             <a:fld id="{B6CC3BC1-992D-1F43-98B1-8B8E610D7F7F}" type="datetimeFigureOut">
               <a:rPr kumimoji="1" lang="ko-Kore-DK" altLang="en-US" smtClean="0"/>
-              <a:t>12/14/23</a:t>
+              <a:t>11/15/24</a:t>
             </a:fld>
             <a:endParaRPr kumimoji="1" lang="ko-Kore-DK" altLang="en-US"/>
           </a:p>
@@ -2703,7 +2703,7 @@
           <a:p>
             <a:fld id="{B6CC3BC1-992D-1F43-98B1-8B8E610D7F7F}" type="datetimeFigureOut">
               <a:rPr kumimoji="1" lang="ko-Kore-DK" altLang="en-US" smtClean="0"/>
-              <a:t>12/14/23</a:t>
+              <a:t>11/15/24</a:t>
             </a:fld>
             <a:endParaRPr kumimoji="1" lang="ko-Kore-DK" altLang="en-US"/>
           </a:p>
@@ -2946,7 +2946,7 @@
           <a:p>
             <a:fld id="{B6CC3BC1-992D-1F43-98B1-8B8E610D7F7F}" type="datetimeFigureOut">
               <a:rPr kumimoji="1" lang="ko-Kore-DK" altLang="en-US" smtClean="0"/>
-              <a:t>12/14/23</a:t>
+              <a:t>11/15/24</a:t>
             </a:fld>
             <a:endParaRPr kumimoji="1" lang="ko-Kore-DK" altLang="en-US"/>
           </a:p>
@@ -4395,7 +4395,12 @@
             <p:ph idx="1"/>
           </p:nvPr>
         </p:nvSpPr>
-        <p:spPr/>
+        <p:spPr>
+          <a:xfrm>
+            <a:off x="838200" y="1825625"/>
+            <a:ext cx="10515600" cy="4667250"/>
+          </a:xfrm>
+        </p:spPr>
         <p:txBody>
           <a:bodyPr/>
           <a:lstStyle/>
@@ -4405,7 +4410,7 @@
             </a:pPr>
             <a:r>
               <a:rPr lang="en-US" dirty="0"/>
-              <a:t>Need to merge “m” sorted records(files) into 1 sorted records.</a:t>
+              <a:t>Need to merge “m” sorted record blocks into 1 sorted record block.</a:t>
             </a:r>
           </a:p>
           <a:p>
@@ -4414,7 +4419,7 @@
             </a:pPr>
             <a:r>
               <a:rPr lang="en-US" dirty="0"/>
-              <a:t>Let there are total ”n” records</a:t>
+              <a:t>Let there are total ”n” records.</a:t>
             </a:r>
           </a:p>
           <a:p>
@@ -4423,15 +4428,22 @@
             </a:pPr>
             <a:r>
               <a:rPr lang="en-US" dirty="0"/>
-              <a:t>Basic way will me to compare m times for each record O(</a:t>
-            </a:r>
-            <a:r>
-              <a:rPr lang="en-US" dirty="0" err="1"/>
-              <a:t>mn</a:t>
-            </a:r>
+              <a:t>We need to find the smallest record among m blocks. (and repeat this n times)</a:t>
+            </a:r>
+          </a:p>
+          <a:p>
+            <a:pPr marL="0" indent="0">
+              <a:buNone/>
+            </a:pPr>
+            <a:endParaRPr lang="en-US" dirty="0"/>
+          </a:p>
+          <a:p>
+            <a:pPr marL="0" indent="0">
+              <a:buNone/>
+            </a:pPr>
             <a:r>
               <a:rPr lang="en-US" dirty="0"/>
-              <a:t>)</a:t>
+              <a:t>Basic way is to simply compare m times O(n m)</a:t>
             </a:r>
           </a:p>
           <a:p>
@@ -4440,7 +4452,7 @@
             </a:pPr>
             <a:r>
               <a:rPr lang="en-US" dirty="0"/>
-              <a:t>We used tournament tree O(n log m)</a:t>
+              <a:t>We use tournament tree O(n log m)</a:t>
             </a:r>
           </a:p>
           <a:p>
@@ -4449,7 +4461,16 @@
             </a:pPr>
             <a:r>
               <a:rPr lang="en-US" dirty="0"/>
-              <a:t>For files of total 2GB, m is 1000. The difference gets bigger as the total size increases</a:t>
+              <a:t>If there are total 2GB of records, m is 2 GB / 2 MB = 1000.</a:t>
+            </a:r>
+          </a:p>
+          <a:p>
+            <a:pPr marL="0" indent="0">
+              <a:buNone/>
+            </a:pPr>
+            <a:r>
+              <a:rPr lang="en-US" dirty="0"/>
+              <a:t>m increases linearly as the total size increases</a:t>
             </a:r>
           </a:p>
           <a:p>

</xml_diff>